<commit_message>
Adjust ppt file font style
</commit_message>
<xml_diff>
--- a/doc/Learn_Perl_in_2hours_by_bigdatapi.pptx
+++ b/doc/Learn_Perl_in_2hours_by_bigdatapi.pptx
@@ -326,7 +326,7 @@
             <a:fld id="{1D8BD707-D9CF-40AE-B4C6-C98DA3205C09}" type="datetimeFigureOut">
               <a:rPr lang="en-US" smtClean="0"/>
               <a:pPr/>
-              <a:t>8/26/2014</a:t>
+              <a:t>8/30/2014</a:t>
             </a:fld>
             <a:endParaRPr lang="en-US"/>
           </a:p>
@@ -493,7 +493,7 @@
             <a:fld id="{1D8BD707-D9CF-40AE-B4C6-C98DA3205C09}" type="datetimeFigureOut">
               <a:rPr lang="en-US" smtClean="0"/>
               <a:pPr/>
-              <a:t>8/26/2014</a:t>
+              <a:t>8/30/2014</a:t>
             </a:fld>
             <a:endParaRPr lang="en-US"/>
           </a:p>
@@ -670,7 +670,7 @@
             <a:fld id="{1D8BD707-D9CF-40AE-B4C6-C98DA3205C09}" type="datetimeFigureOut">
               <a:rPr lang="en-US" smtClean="0"/>
               <a:pPr/>
-              <a:t>8/26/2014</a:t>
+              <a:t>8/30/2014</a:t>
             </a:fld>
             <a:endParaRPr lang="en-US"/>
           </a:p>
@@ -837,7 +837,7 @@
             <a:fld id="{1D8BD707-D9CF-40AE-B4C6-C98DA3205C09}" type="datetimeFigureOut">
               <a:rPr lang="en-US" smtClean="0"/>
               <a:pPr/>
-              <a:t>8/26/2014</a:t>
+              <a:t>8/30/2014</a:t>
             </a:fld>
             <a:endParaRPr lang="en-US"/>
           </a:p>
@@ -1080,7 +1080,7 @@
             <a:fld id="{1D8BD707-D9CF-40AE-B4C6-C98DA3205C09}" type="datetimeFigureOut">
               <a:rPr lang="en-US" smtClean="0"/>
               <a:pPr/>
-              <a:t>8/26/2014</a:t>
+              <a:t>8/30/2014</a:t>
             </a:fld>
             <a:endParaRPr lang="en-US"/>
           </a:p>
@@ -1365,7 +1365,7 @@
             <a:fld id="{1D8BD707-D9CF-40AE-B4C6-C98DA3205C09}" type="datetimeFigureOut">
               <a:rPr lang="en-US" smtClean="0"/>
               <a:pPr/>
-              <a:t>8/26/2014</a:t>
+              <a:t>8/30/2014</a:t>
             </a:fld>
             <a:endParaRPr lang="en-US"/>
           </a:p>
@@ -1784,7 +1784,7 @@
             <a:fld id="{1D8BD707-D9CF-40AE-B4C6-C98DA3205C09}" type="datetimeFigureOut">
               <a:rPr lang="en-US" smtClean="0"/>
               <a:pPr/>
-              <a:t>8/26/2014</a:t>
+              <a:t>8/30/2014</a:t>
             </a:fld>
             <a:endParaRPr lang="en-US"/>
           </a:p>
@@ -1899,7 +1899,7 @@
             <a:fld id="{1D8BD707-D9CF-40AE-B4C6-C98DA3205C09}" type="datetimeFigureOut">
               <a:rPr lang="en-US" smtClean="0"/>
               <a:pPr/>
-              <a:t>8/26/2014</a:t>
+              <a:t>8/30/2014</a:t>
             </a:fld>
             <a:endParaRPr lang="en-US"/>
           </a:p>
@@ -1991,7 +1991,7 @@
             <a:fld id="{1D8BD707-D9CF-40AE-B4C6-C98DA3205C09}" type="datetimeFigureOut">
               <a:rPr lang="en-US" smtClean="0"/>
               <a:pPr/>
-              <a:t>8/26/2014</a:t>
+              <a:t>8/30/2014</a:t>
             </a:fld>
             <a:endParaRPr lang="en-US"/>
           </a:p>
@@ -2265,7 +2265,7 @@
             <a:fld id="{1D8BD707-D9CF-40AE-B4C6-C98DA3205C09}" type="datetimeFigureOut">
               <a:rPr lang="en-US" smtClean="0"/>
               <a:pPr/>
-              <a:t>8/26/2014</a:t>
+              <a:t>8/30/2014</a:t>
             </a:fld>
             <a:endParaRPr lang="en-US"/>
           </a:p>
@@ -2515,7 +2515,7 @@
             <a:fld id="{1D8BD707-D9CF-40AE-B4C6-C98DA3205C09}" type="datetimeFigureOut">
               <a:rPr lang="en-US" smtClean="0"/>
               <a:pPr/>
-              <a:t>8/26/2014</a:t>
+              <a:t>8/30/2014</a:t>
             </a:fld>
             <a:endParaRPr lang="en-US"/>
           </a:p>
@@ -2725,7 +2725,7 @@
             <a:fld id="{1D8BD707-D9CF-40AE-B4C6-C98DA3205C09}" type="datetimeFigureOut">
               <a:rPr lang="en-US" smtClean="0"/>
               <a:pPr/>
-              <a:t>8/26/2014</a:t>
+              <a:t>8/30/2014</a:t>
             </a:fld>
             <a:endParaRPr lang="en-US"/>
           </a:p>
@@ -5689,154 +5689,63 @@
             </a:pPr>
             <a:r>
               <a:rPr lang="en-US" altLang="zh-CN" sz="4800" dirty="0" smtClean="0">
-                <a:ln w="18415" cmpd="sng">
-                  <a:solidFill>
-                    <a:srgbClr val="FFFFFF"/>
-                  </a:solidFill>
-                  <a:prstDash val="solid"/>
-                </a:ln>
                 <a:solidFill>
-                  <a:srgbClr val="00B0F0"/>
+                  <a:srgbClr val="FFC000"/>
                 </a:solidFill>
-                <a:effectLst>
-                  <a:outerShdw blurRad="63500" dir="3600000" algn="tl" rotWithShape="0">
-                    <a:srgbClr val="000000">
-                      <a:alpha val="70000"/>
-                    </a:srgbClr>
-                  </a:outerShdw>
-                </a:effectLst>
                 <a:latin typeface="Gill Sans MT Condensed" pitchFamily="34" charset="0"/>
               </a:rPr>
               <a:t> </a:t>
             </a:r>
             <a:r>
               <a:rPr lang="en-US" altLang="zh-CN" sz="4800" dirty="0" err="1" smtClean="0">
-                <a:ln w="18415" cmpd="sng">
-                  <a:solidFill>
-                    <a:srgbClr val="FFFFFF"/>
-                  </a:solidFill>
-                  <a:prstDash val="solid"/>
-                </a:ln>
                 <a:solidFill>
-                  <a:srgbClr val="00B0F0"/>
+                  <a:srgbClr val="FFC000"/>
                 </a:solidFill>
-                <a:effectLst>
-                  <a:outerShdw blurRad="63500" dir="3600000" algn="tl" rotWithShape="0">
-                    <a:srgbClr val="000000">
-                      <a:alpha val="70000"/>
-                    </a:srgbClr>
-                  </a:outerShdw>
-                </a:effectLst>
                 <a:latin typeface="Gill Sans MT Condensed" pitchFamily="34" charset="0"/>
               </a:rPr>
               <a:t>runnable</a:t>
             </a:r>
             <a:r>
               <a:rPr lang="en-US" altLang="zh-CN" sz="4800" dirty="0" smtClean="0">
-                <a:ln w="18415" cmpd="sng">
-                  <a:solidFill>
-                    <a:srgbClr val="FFFFFF"/>
-                  </a:solidFill>
-                  <a:prstDash val="solid"/>
-                </a:ln>
                 <a:solidFill>
-                  <a:srgbClr val="00B0F0"/>
+                  <a:srgbClr val="FFC000"/>
                 </a:solidFill>
-                <a:effectLst>
-                  <a:outerShdw blurRad="63500" dir="3600000" algn="tl" rotWithShape="0">
-                    <a:srgbClr val="000000">
-                      <a:alpha val="70000"/>
-                    </a:srgbClr>
-                  </a:outerShdw>
-                </a:effectLst>
                 <a:latin typeface="Gill Sans MT Condensed" pitchFamily="34" charset="0"/>
               </a:rPr>
               <a:t> script(shebang/</a:t>
             </a:r>
             <a:r>
               <a:rPr lang="en-US" altLang="zh-CN" sz="4800" dirty="0" err="1" smtClean="0">
-                <a:ln w="18415" cmpd="sng">
-                  <a:solidFill>
-                    <a:srgbClr val="FFFFFF"/>
-                  </a:solidFill>
-                  <a:prstDash val="solid"/>
-                </a:ln>
                 <a:solidFill>
-                  <a:srgbClr val="00B0F0"/>
+                  <a:srgbClr val="FFC000"/>
                 </a:solidFill>
-                <a:effectLst>
-                  <a:outerShdw blurRad="63500" dir="3600000" algn="tl" rotWithShape="0">
-                    <a:srgbClr val="000000">
-                      <a:alpha val="70000"/>
-                    </a:srgbClr>
-                  </a:outerShdw>
-                </a:effectLst>
                 <a:latin typeface="Gill Sans MT Condensed" pitchFamily="34" charset="0"/>
               </a:rPr>
               <a:t>pragma</a:t>
             </a:r>
             <a:r>
               <a:rPr lang="en-US" altLang="zh-CN" sz="4800" dirty="0" smtClean="0">
-                <a:ln w="18415" cmpd="sng">
-                  <a:solidFill>
-                    <a:srgbClr val="FFFFFF"/>
-                  </a:solidFill>
-                  <a:prstDash val="solid"/>
-                </a:ln>
                 <a:solidFill>
-                  <a:srgbClr val="00B0F0"/>
+                  <a:srgbClr val="FFC000"/>
                 </a:solidFill>
-                <a:effectLst>
-                  <a:outerShdw blurRad="63500" dir="3600000" algn="tl" rotWithShape="0">
-                    <a:srgbClr val="000000">
-                      <a:alpha val="70000"/>
-                    </a:srgbClr>
-                  </a:outerShdw>
-                </a:effectLst>
                 <a:latin typeface="Gill Sans MT Condensed" pitchFamily="34" charset="0"/>
               </a:rPr>
               <a:t>/</a:t>
             </a:r>
             <a:r>
               <a:rPr lang="en-US" altLang="zh-CN" sz="4800" dirty="0" err="1" smtClean="0">
-                <a:ln w="18415" cmpd="sng">
-                  <a:solidFill>
-                    <a:srgbClr val="FFFFFF"/>
-                  </a:solidFill>
-                  <a:prstDash val="solid"/>
-                </a:ln>
                 <a:solidFill>
-                  <a:srgbClr val="00B0F0"/>
+                  <a:srgbClr val="FFC000"/>
                 </a:solidFill>
-                <a:effectLst>
-                  <a:outerShdw blurRad="63500" dir="3600000" algn="tl" rotWithShape="0">
-                    <a:srgbClr val="000000">
-                      <a:alpha val="70000"/>
-                    </a:srgbClr>
-                  </a:outerShdw>
-                </a:effectLst>
                 <a:latin typeface="Gill Sans MT Condensed" pitchFamily="34" charset="0"/>
               </a:rPr>
               <a:t>syntanx</a:t>
             </a:r>
             <a:r>
               <a:rPr lang="en-US" altLang="zh-CN" sz="4800" dirty="0" smtClean="0">
-                <a:ln w="18415" cmpd="sng">
-                  <a:solidFill>
-                    <a:srgbClr val="FFFFFF"/>
-                  </a:solidFill>
-                  <a:prstDash val="solid"/>
-                </a:ln>
                 <a:solidFill>
-                  <a:srgbClr val="00B0F0"/>
+                  <a:srgbClr val="FFC000"/>
                 </a:solidFill>
-                <a:effectLst>
-                  <a:outerShdw blurRad="63500" dir="3600000" algn="tl" rotWithShape="0">
-                    <a:srgbClr val="000000">
-                      <a:alpha val="70000"/>
-                    </a:srgbClr>
-                  </a:outerShdw>
-                </a:effectLst>
                 <a:latin typeface="Gill Sans MT Condensed" pitchFamily="34" charset="0"/>
               </a:rPr>
               <a:t>)</a:t>
@@ -5849,47 +5758,12 @@
             </a:pPr>
             <a:r>
               <a:rPr lang="en-US" altLang="zh-CN" sz="4800" dirty="0" smtClean="0">
-                <a:ln w="18415" cmpd="sng">
-                  <a:solidFill>
-                    <a:srgbClr val="FFFFFF"/>
-                  </a:solidFill>
-                  <a:prstDash val="solid"/>
-                </a:ln>
                 <a:solidFill>
-                  <a:srgbClr val="00B0F0"/>
+                  <a:srgbClr val="FFC000"/>
                 </a:solidFill>
-                <a:effectLst>
-                  <a:outerShdw blurRad="63500" dir="3600000" algn="tl" rotWithShape="0">
-                    <a:srgbClr val="000000">
-                      <a:alpha val="70000"/>
-                    </a:srgbClr>
-                  </a:outerShdw>
-                </a:effectLst>
                 <a:latin typeface="Gill Sans MT Condensed" pitchFamily="34" charset="0"/>
               </a:rPr>
-              <a:t> </a:t>
-            </a:r>
-            <a:r>
-              <a:rPr lang="en-US" altLang="zh-CN" sz="4800" dirty="0" smtClean="0">
-                <a:ln w="18415" cmpd="sng">
-                  <a:solidFill>
-                    <a:srgbClr val="FFFFFF"/>
-                  </a:solidFill>
-                  <a:prstDash val="solid"/>
-                </a:ln>
-                <a:solidFill>
-                  <a:srgbClr val="00B0F0"/>
-                </a:solidFill>
-                <a:effectLst>
-                  <a:outerShdw blurRad="63500" dir="3600000" algn="tl" rotWithShape="0">
-                    <a:srgbClr val="000000">
-                      <a:alpha val="70000"/>
-                    </a:srgbClr>
-                  </a:outerShdw>
-                </a:effectLst>
-                <a:latin typeface="Gill Sans MT Condensed" pitchFamily="34" charset="0"/>
-              </a:rPr>
-              <a:t>variable (scalar array hash)</a:t>
+              <a:t> variable (scalar array hash)</a:t>
             </a:r>
           </a:p>
           <a:p>
@@ -5899,111 +5773,31 @@
             </a:pPr>
             <a:r>
               <a:rPr lang="en-US" altLang="zh-CN" sz="4800" dirty="0" smtClean="0">
-                <a:ln w="18415" cmpd="sng">
-                  <a:solidFill>
-                    <a:srgbClr val="FFFFFF"/>
-                  </a:solidFill>
-                  <a:prstDash val="solid"/>
-                </a:ln>
                 <a:solidFill>
-                  <a:srgbClr val="00B0F0"/>
+                  <a:srgbClr val="FFC000"/>
                 </a:solidFill>
-                <a:effectLst>
-                  <a:outerShdw blurRad="63500" dir="3600000" algn="tl" rotWithShape="0">
-                    <a:srgbClr val="000000">
-                      <a:alpha val="70000"/>
-                    </a:srgbClr>
-                  </a:outerShdw>
-                </a:effectLst>
                 <a:latin typeface="Gill Sans MT Condensed" pitchFamily="34" charset="0"/>
               </a:rPr>
-              <a:t> </a:t>
-            </a:r>
-            <a:r>
-              <a:rPr lang="en-US" altLang="zh-CN" sz="4800" dirty="0" smtClean="0">
-                <a:ln w="18415" cmpd="sng">
-                  <a:solidFill>
-                    <a:srgbClr val="FFFFFF"/>
-                  </a:solidFill>
-                  <a:prstDash val="solid"/>
-                </a:ln>
-                <a:solidFill>
-                  <a:srgbClr val="00B0F0"/>
-                </a:solidFill>
-                <a:effectLst>
-                  <a:outerShdw blurRad="63500" dir="3600000" algn="tl" rotWithShape="0">
-                    <a:srgbClr val="000000">
-                      <a:alpha val="70000"/>
-                    </a:srgbClr>
-                  </a:outerShdw>
-                </a:effectLst>
-                <a:latin typeface="Gill Sans MT Condensed" pitchFamily="34" charset="0"/>
-              </a:rPr>
-              <a:t>prototype (sub </a:t>
+              <a:t> prototype (sub </a:t>
             </a:r>
             <a:r>
               <a:rPr lang="en-US" altLang="zh-CN" sz="4800" dirty="0" err="1" smtClean="0">
-                <a:ln w="18415" cmpd="sng">
-                  <a:solidFill>
-                    <a:srgbClr val="FFFFFF"/>
-                  </a:solidFill>
-                  <a:prstDash val="solid"/>
-                </a:ln>
                 <a:solidFill>
-                  <a:srgbClr val="00B0F0"/>
+                  <a:srgbClr val="FFC000"/>
                 </a:solidFill>
-                <a:effectLst>
-                  <a:outerShdw blurRad="63500" dir="3600000" algn="tl" rotWithShape="0">
-                    <a:srgbClr val="000000">
-                      <a:alpha val="70000"/>
-                    </a:srgbClr>
-                  </a:outerShdw>
-                </a:effectLst>
                 <a:latin typeface="Gill Sans MT Condensed" pitchFamily="34" charset="0"/>
               </a:rPr>
               <a:t>fibnacci</a:t>
             </a:r>
             <a:r>
               <a:rPr lang="en-US" altLang="zh-CN" sz="4800" dirty="0" smtClean="0">
-                <a:ln w="18415" cmpd="sng">
-                  <a:solidFill>
-                    <a:srgbClr val="FFFFFF"/>
-                  </a:solidFill>
-                  <a:prstDash val="solid"/>
-                </a:ln>
                 <a:solidFill>
-                  <a:srgbClr val="00B0F0"/>
+                  <a:srgbClr val="FFC000"/>
                 </a:solidFill>
-                <a:effectLst>
-                  <a:outerShdw blurRad="63500" dir="3600000" algn="tl" rotWithShape="0">
-                    <a:srgbClr val="000000">
-                      <a:alpha val="70000"/>
-                    </a:srgbClr>
-                  </a:outerShdw>
-                </a:effectLst>
                 <a:latin typeface="Gill Sans MT Condensed" pitchFamily="34" charset="0"/>
               </a:rPr>
               <a:t>($$))</a:t>
             </a:r>
-            <a:endParaRPr lang="en-US" altLang="zh-CN" sz="4800" dirty="0" smtClean="0">
-              <a:ln w="18415" cmpd="sng">
-                <a:solidFill>
-                  <a:srgbClr val="FFFFFF"/>
-                </a:solidFill>
-                <a:prstDash val="solid"/>
-              </a:ln>
-              <a:solidFill>
-                <a:srgbClr val="00B0F0"/>
-              </a:solidFill>
-              <a:effectLst>
-                <a:outerShdw blurRad="63500" dir="3600000" algn="tl" rotWithShape="0">
-                  <a:srgbClr val="000000">
-                    <a:alpha val="70000"/>
-                  </a:srgbClr>
-                </a:outerShdw>
-              </a:effectLst>
-              <a:latin typeface="Gill Sans MT Condensed" pitchFamily="34" charset="0"/>
-            </a:endParaRPr>
           </a:p>
           <a:p>
             <a:pPr>
@@ -6012,88 +5806,27 @@
             </a:pPr>
             <a:r>
               <a:rPr lang="en-US" altLang="zh-CN" sz="4800" dirty="0" smtClean="0">
-                <a:ln w="18415" cmpd="sng">
-                  <a:solidFill>
-                    <a:srgbClr val="FFFFFF"/>
-                  </a:solidFill>
-                  <a:prstDash val="solid"/>
-                </a:ln>
                 <a:solidFill>
-                  <a:srgbClr val="00B0F0"/>
+                  <a:srgbClr val="FFC000"/>
                 </a:solidFill>
-                <a:effectLst>
-                  <a:outerShdw blurRad="63500" dir="3600000" algn="tl" rotWithShape="0">
-                    <a:srgbClr val="000000">
-                      <a:alpha val="70000"/>
-                    </a:srgbClr>
-                  </a:outerShdw>
-                </a:effectLst>
                 <a:latin typeface="Gill Sans MT Condensed" pitchFamily="34" charset="0"/>
               </a:rPr>
-              <a:t> </a:t>
-            </a:r>
-            <a:r>
-              <a:rPr lang="en-US" altLang="zh-CN" sz="4800" dirty="0" smtClean="0">
-                <a:ln w="18415" cmpd="sng">
-                  <a:solidFill>
-                    <a:srgbClr val="FFFFFF"/>
-                  </a:solidFill>
-                  <a:prstDash val="solid"/>
-                </a:ln>
-                <a:solidFill>
-                  <a:srgbClr val="00B0F0"/>
-                </a:solidFill>
-                <a:effectLst>
-                  <a:outerShdw blurRad="63500" dir="3600000" algn="tl" rotWithShape="0">
-                    <a:srgbClr val="000000">
-                      <a:alpha val="70000"/>
-                    </a:srgbClr>
-                  </a:outerShdw>
-                </a:effectLst>
-                <a:latin typeface="Gill Sans MT Condensed" pitchFamily="34" charset="0"/>
-              </a:rPr>
-              <a:t>recursion (sub </a:t>
+              <a:t> recursion (sub </a:t>
             </a:r>
             <a:r>
               <a:rPr lang="en-US" altLang="zh-CN" sz="4800" dirty="0" err="1" smtClean="0">
-                <a:ln w="18415" cmpd="sng">
-                  <a:solidFill>
-                    <a:srgbClr val="FFFFFF"/>
-                  </a:solidFill>
-                  <a:prstDash val="solid"/>
-                </a:ln>
                 <a:solidFill>
-                  <a:srgbClr val="00B0F0"/>
+                  <a:srgbClr val="FFC000"/>
                 </a:solidFill>
-                <a:effectLst>
-                  <a:outerShdw blurRad="63500" dir="3600000" algn="tl" rotWithShape="0">
-                    <a:srgbClr val="000000">
-                      <a:alpha val="70000"/>
-                    </a:srgbClr>
-                  </a:outerShdw>
-                </a:effectLst>
                 <a:latin typeface="Gill Sans MT Condensed" pitchFamily="34" charset="0"/>
               </a:rPr>
               <a:t>fibnacci</a:t>
             </a:r>
             <a:r>
               <a:rPr lang="en-US" altLang="zh-CN" sz="4800" dirty="0" smtClean="0">
-                <a:ln w="18415" cmpd="sng">
-                  <a:solidFill>
-                    <a:srgbClr val="FFFFFF"/>
-                  </a:solidFill>
-                  <a:prstDash val="solid"/>
-                </a:ln>
                 <a:solidFill>
-                  <a:srgbClr val="00B0F0"/>
+                  <a:srgbClr val="FFC000"/>
                 </a:solidFill>
-                <a:effectLst>
-                  <a:outerShdw blurRad="63500" dir="3600000" algn="tl" rotWithShape="0">
-                    <a:srgbClr val="000000">
-                      <a:alpha val="70000"/>
-                    </a:srgbClr>
-                  </a:outerShdw>
-                </a:effectLst>
                 <a:latin typeface="Gill Sans MT Condensed" pitchFamily="34" charset="0"/>
               </a:rPr>
               <a:t>)</a:t>
@@ -6106,47 +5839,12 @@
             </a:pPr>
             <a:r>
               <a:rPr lang="en-US" altLang="zh-CN" sz="4800" dirty="0" smtClean="0">
-                <a:ln w="18415" cmpd="sng">
-                  <a:solidFill>
-                    <a:srgbClr val="FFFFFF"/>
-                  </a:solidFill>
-                  <a:prstDash val="solid"/>
-                </a:ln>
                 <a:solidFill>
-                  <a:srgbClr val="00B0F0"/>
+                  <a:srgbClr val="FFC000"/>
                 </a:solidFill>
-                <a:effectLst>
-                  <a:outerShdw blurRad="63500" dir="3600000" algn="tl" rotWithShape="0">
-                    <a:srgbClr val="000000">
-                      <a:alpha val="70000"/>
-                    </a:srgbClr>
-                  </a:outerShdw>
-                </a:effectLst>
                 <a:latin typeface="Gill Sans MT Condensed" pitchFamily="34" charset="0"/>
               </a:rPr>
-              <a:t> </a:t>
-            </a:r>
-            <a:r>
-              <a:rPr lang="en-US" altLang="zh-CN" sz="4800" dirty="0" smtClean="0">
-                <a:ln w="18415" cmpd="sng">
-                  <a:solidFill>
-                    <a:srgbClr val="FFFFFF"/>
-                  </a:solidFill>
-                  <a:prstDash val="solid"/>
-                </a:ln>
-                <a:solidFill>
-                  <a:srgbClr val="00B0F0"/>
-                </a:solidFill>
-                <a:effectLst>
-                  <a:outerShdw blurRad="63500" dir="3600000" algn="tl" rotWithShape="0">
-                    <a:srgbClr val="000000">
-                      <a:alpha val="70000"/>
-                    </a:srgbClr>
-                  </a:outerShdw>
-                </a:effectLst>
-                <a:latin typeface="Gill Sans MT Condensed" pitchFamily="34" charset="0"/>
-              </a:rPr>
-              <a:t>basic IO (print)</a:t>
+              <a:t> basic IO (print)</a:t>
             </a:r>
           </a:p>
           <a:p>
@@ -6156,47 +5854,12 @@
             </a:pPr>
             <a:r>
               <a:rPr lang="en-US" altLang="zh-CN" sz="4800" dirty="0" smtClean="0">
-                <a:ln w="18415" cmpd="sng">
-                  <a:solidFill>
-                    <a:srgbClr val="FFFFFF"/>
-                  </a:solidFill>
-                  <a:prstDash val="solid"/>
-                </a:ln>
                 <a:solidFill>
-                  <a:srgbClr val="00B0F0"/>
+                  <a:srgbClr val="FFC000"/>
                 </a:solidFill>
-                <a:effectLst>
-                  <a:outerShdw blurRad="63500" dir="3600000" algn="tl" rotWithShape="0">
-                    <a:srgbClr val="000000">
-                      <a:alpha val="70000"/>
-                    </a:srgbClr>
-                  </a:outerShdw>
-                </a:effectLst>
                 <a:latin typeface="Gill Sans MT Condensed" pitchFamily="34" charset="0"/>
               </a:rPr>
-              <a:t> </a:t>
-            </a:r>
-            <a:r>
-              <a:rPr lang="en-US" altLang="zh-CN" sz="4800" dirty="0" smtClean="0">
-                <a:ln w="18415" cmpd="sng">
-                  <a:solidFill>
-                    <a:srgbClr val="FFFFFF"/>
-                  </a:solidFill>
-                  <a:prstDash val="solid"/>
-                </a:ln>
-                <a:solidFill>
-                  <a:srgbClr val="00B0F0"/>
-                </a:solidFill>
-                <a:effectLst>
-                  <a:outerShdw blurRad="63500" dir="3600000" algn="tl" rotWithShape="0">
-                    <a:srgbClr val="000000">
-                      <a:alpha val="70000"/>
-                    </a:srgbClr>
-                  </a:outerShdw>
-                </a:effectLst>
-                <a:latin typeface="Gill Sans MT Condensed" pitchFamily="34" charset="0"/>
-              </a:rPr>
-              <a:t>expression </a:t>
+              <a:t> expression </a:t>
             </a:r>
           </a:p>
           <a:p>
@@ -6206,47 +5869,12 @@
             </a:pPr>
             <a:r>
               <a:rPr lang="en-US" altLang="zh-CN" sz="4800" dirty="0" smtClean="0">
-                <a:ln w="18415" cmpd="sng">
-                  <a:solidFill>
-                    <a:srgbClr val="FFFFFF"/>
-                  </a:solidFill>
-                  <a:prstDash val="solid"/>
-                </a:ln>
                 <a:solidFill>
-                  <a:srgbClr val="00B0F0"/>
+                  <a:srgbClr val="FFC000"/>
                 </a:solidFill>
-                <a:effectLst>
-                  <a:outerShdw blurRad="63500" dir="3600000" algn="tl" rotWithShape="0">
-                    <a:srgbClr val="000000">
-                      <a:alpha val="70000"/>
-                    </a:srgbClr>
-                  </a:outerShdw>
-                </a:effectLst>
                 <a:latin typeface="Gill Sans MT Condensed" pitchFamily="34" charset="0"/>
               </a:rPr>
-              <a:t> </a:t>
-            </a:r>
-            <a:r>
-              <a:rPr lang="en-US" altLang="zh-CN" sz="4800" dirty="0" smtClean="0">
-                <a:ln w="18415" cmpd="sng">
-                  <a:solidFill>
-                    <a:srgbClr val="FFFFFF"/>
-                  </a:solidFill>
-                  <a:prstDash val="solid"/>
-                </a:ln>
-                <a:solidFill>
-                  <a:srgbClr val="00B0F0"/>
-                </a:solidFill>
-                <a:effectLst>
-                  <a:outerShdw blurRad="63500" dir="3600000" algn="tl" rotWithShape="0">
-                    <a:srgbClr val="000000">
-                      <a:alpha val="70000"/>
-                    </a:srgbClr>
-                  </a:outerShdw>
-                </a:effectLst>
-                <a:latin typeface="Gill Sans MT Condensed" pitchFamily="34" charset="0"/>
-              </a:rPr>
-              <a:t>statement</a:t>
+              <a:t> statement</a:t>
             </a:r>
           </a:p>
           <a:p>
@@ -6256,47 +5884,12 @@
             </a:pPr>
             <a:r>
               <a:rPr lang="en-US" altLang="zh-CN" sz="4800" dirty="0" smtClean="0">
-                <a:ln w="18415" cmpd="sng">
-                  <a:solidFill>
-                    <a:srgbClr val="FFFFFF"/>
-                  </a:solidFill>
-                  <a:prstDash val="solid"/>
-                </a:ln>
                 <a:solidFill>
-                  <a:srgbClr val="00B0F0"/>
+                  <a:srgbClr val="FFC000"/>
                 </a:solidFill>
-                <a:effectLst>
-                  <a:outerShdw blurRad="63500" dir="3600000" algn="tl" rotWithShape="0">
-                    <a:srgbClr val="000000">
-                      <a:alpha val="70000"/>
-                    </a:srgbClr>
-                  </a:outerShdw>
-                </a:effectLst>
                 <a:latin typeface="Gill Sans MT Condensed" pitchFamily="34" charset="0"/>
               </a:rPr>
-              <a:t> </a:t>
-            </a:r>
-            <a:r>
-              <a:rPr lang="en-US" altLang="zh-CN" sz="4800" dirty="0" smtClean="0">
-                <a:ln w="18415" cmpd="sng">
-                  <a:solidFill>
-                    <a:srgbClr val="FFFFFF"/>
-                  </a:solidFill>
-                  <a:prstDash val="solid"/>
-                </a:ln>
-                <a:solidFill>
-                  <a:srgbClr val="00B0F0"/>
-                </a:solidFill>
-                <a:effectLst>
-                  <a:outerShdw blurRad="63500" dir="3600000" algn="tl" rotWithShape="0">
-                    <a:srgbClr val="000000">
-                      <a:alpha val="70000"/>
-                    </a:srgbClr>
-                  </a:outerShdw>
-                </a:effectLst>
-                <a:latin typeface="Gill Sans MT Condensed" pitchFamily="34" charset="0"/>
-              </a:rPr>
-              <a:t>container (hash array)</a:t>
+              <a:t> container (hash array)</a:t>
             </a:r>
           </a:p>
           <a:p>
@@ -6306,22 +5899,9 @@
             </a:pPr>
             <a:r>
               <a:rPr lang="en-US" altLang="zh-CN" sz="4800" dirty="0" smtClean="0">
-                <a:ln w="18415" cmpd="sng">
-                  <a:solidFill>
-                    <a:srgbClr val="FFFFFF"/>
-                  </a:solidFill>
-                  <a:prstDash val="solid"/>
-                </a:ln>
                 <a:solidFill>
-                  <a:srgbClr val="00B0F0"/>
+                  <a:srgbClr val="FFC000"/>
                 </a:solidFill>
-                <a:effectLst>
-                  <a:outerShdw blurRad="63500" dir="3600000" algn="tl" rotWithShape="0">
-                    <a:srgbClr val="000000">
-                      <a:alpha val="70000"/>
-                    </a:srgbClr>
-                  </a:outerShdw>
-                </a:effectLst>
                 <a:latin typeface="Gill Sans MT Condensed" pitchFamily="34" charset="0"/>
               </a:rPr>
               <a:t> reference (anonymous array / hash)</a:t>
@@ -7119,65 +6699,17 @@
             </a:pPr>
             <a:r>
               <a:rPr lang="en-US" altLang="zh-CN" sz="4800" dirty="0" smtClean="0">
-                <a:ln w="18415" cmpd="sng">
-                  <a:solidFill>
-                    <a:srgbClr val="FFFFFF"/>
-                  </a:solidFill>
-                  <a:prstDash val="solid"/>
-                </a:ln>
                 <a:solidFill>
-                  <a:srgbClr val="00B0F0"/>
+                  <a:srgbClr val="FFC000"/>
                 </a:solidFill>
-                <a:effectLst>
-                  <a:outerShdw blurRad="63500" dir="3600000" algn="tl" rotWithShape="0">
-                    <a:srgbClr val="000000">
-                      <a:alpha val="70000"/>
-                    </a:srgbClr>
-                  </a:outerShdw>
-                </a:effectLst>
                 <a:latin typeface="Gill Sans MT Condensed" pitchFamily="34" charset="0"/>
               </a:rPr>
-              <a:t> </a:t>
-            </a:r>
-            <a:r>
-              <a:rPr lang="en-US" altLang="zh-CN" sz="4800" dirty="0" smtClean="0">
-                <a:ln w="18415" cmpd="sng">
-                  <a:solidFill>
-                    <a:srgbClr val="FFFFFF"/>
-                  </a:solidFill>
-                  <a:prstDash val="solid"/>
-                </a:ln>
-                <a:solidFill>
-                  <a:srgbClr val="00B0F0"/>
-                </a:solidFill>
-                <a:effectLst>
-                  <a:outerShdw blurRad="63500" dir="3600000" algn="tl" rotWithShape="0">
-                    <a:srgbClr val="000000">
-                      <a:alpha val="70000"/>
-                    </a:srgbClr>
-                  </a:outerShdw>
-                </a:effectLst>
-                <a:latin typeface="Gill Sans MT Condensed" pitchFamily="34" charset="0"/>
-              </a:rPr>
-              <a:t>Scalar</a:t>
+              <a:t> Scalar</a:t>
             </a:r>
             <a:endParaRPr lang="zh-CN" altLang="en-US" sz="4800" dirty="0">
-              <a:ln w="18415" cmpd="sng">
-                <a:solidFill>
-                  <a:srgbClr val="FFFFFF"/>
-                </a:solidFill>
-                <a:prstDash val="solid"/>
-              </a:ln>
               <a:solidFill>
-                <a:srgbClr val="00B0F0"/>
+                <a:srgbClr val="FFC000"/>
               </a:solidFill>
-              <a:effectLst>
-                <a:outerShdw blurRad="63500" dir="3600000" algn="tl" rotWithShape="0">
-                  <a:srgbClr val="000000">
-                    <a:alpha val="70000"/>
-                  </a:srgbClr>
-                </a:outerShdw>
-              </a:effectLst>
               <a:latin typeface="Gill Sans MT Condensed" pitchFamily="34" charset="0"/>
             </a:endParaRPr>
           </a:p>
@@ -7214,65 +6746,17 @@
             </a:pPr>
             <a:r>
               <a:rPr lang="en-US" altLang="zh-CN" sz="4800" dirty="0" smtClean="0">
-                <a:ln w="18415" cmpd="sng">
-                  <a:solidFill>
-                    <a:srgbClr val="FFFFFF"/>
-                  </a:solidFill>
-                  <a:prstDash val="solid"/>
-                </a:ln>
                 <a:solidFill>
-                  <a:srgbClr val="00B0F0"/>
+                  <a:srgbClr val="FFC000"/>
                 </a:solidFill>
-                <a:effectLst>
-                  <a:outerShdw blurRad="63500" dir="3600000" algn="tl" rotWithShape="0">
-                    <a:srgbClr val="000000">
-                      <a:alpha val="70000"/>
-                    </a:srgbClr>
-                  </a:outerShdw>
-                </a:effectLst>
                 <a:latin typeface="Gill Sans MT Condensed" pitchFamily="34" charset="0"/>
               </a:rPr>
-              <a:t> </a:t>
-            </a:r>
-            <a:r>
-              <a:rPr lang="en-US" altLang="zh-CN" sz="4800" dirty="0" smtClean="0">
-                <a:ln w="18415" cmpd="sng">
-                  <a:solidFill>
-                    <a:srgbClr val="FFFFFF"/>
-                  </a:solidFill>
-                  <a:prstDash val="solid"/>
-                </a:ln>
-                <a:solidFill>
-                  <a:srgbClr val="00B0F0"/>
-                </a:solidFill>
-                <a:effectLst>
-                  <a:outerShdw blurRad="63500" dir="3600000" algn="tl" rotWithShape="0">
-                    <a:srgbClr val="000000">
-                      <a:alpha val="70000"/>
-                    </a:srgbClr>
-                  </a:outerShdw>
-                </a:effectLst>
-                <a:latin typeface="Gill Sans MT Condensed" pitchFamily="34" charset="0"/>
-              </a:rPr>
-              <a:t>Array</a:t>
+              <a:t> Array</a:t>
             </a:r>
             <a:endParaRPr lang="zh-CN" altLang="en-US" sz="4800" dirty="0">
-              <a:ln w="18415" cmpd="sng">
-                <a:solidFill>
-                  <a:srgbClr val="FFFFFF"/>
-                </a:solidFill>
-                <a:prstDash val="solid"/>
-              </a:ln>
               <a:solidFill>
-                <a:srgbClr val="00B0F0"/>
+                <a:srgbClr val="FFC000"/>
               </a:solidFill>
-              <a:effectLst>
-                <a:outerShdw blurRad="63500" dir="3600000" algn="tl" rotWithShape="0">
-                  <a:srgbClr val="000000">
-                    <a:alpha val="70000"/>
-                  </a:srgbClr>
-                </a:outerShdw>
-              </a:effectLst>
               <a:latin typeface="Gill Sans MT Condensed" pitchFamily="34" charset="0"/>
             </a:endParaRPr>
           </a:p>
@@ -7309,65 +6793,17 @@
             </a:pPr>
             <a:r>
               <a:rPr lang="en-US" altLang="zh-CN" sz="4800" dirty="0" smtClean="0">
-                <a:ln w="18415" cmpd="sng">
-                  <a:solidFill>
-                    <a:srgbClr val="FFFFFF"/>
-                  </a:solidFill>
-                  <a:prstDash val="solid"/>
-                </a:ln>
                 <a:solidFill>
-                  <a:srgbClr val="00B0F0"/>
+                  <a:srgbClr val="FFC000"/>
                 </a:solidFill>
-                <a:effectLst>
-                  <a:outerShdw blurRad="63500" dir="3600000" algn="tl" rotWithShape="0">
-                    <a:srgbClr val="000000">
-                      <a:alpha val="70000"/>
-                    </a:srgbClr>
-                  </a:outerShdw>
-                </a:effectLst>
                 <a:latin typeface="Gill Sans MT Condensed" pitchFamily="34" charset="0"/>
               </a:rPr>
-              <a:t> </a:t>
-            </a:r>
-            <a:r>
-              <a:rPr lang="en-US" altLang="zh-CN" sz="4800" dirty="0" smtClean="0">
-                <a:ln w="18415" cmpd="sng">
-                  <a:solidFill>
-                    <a:srgbClr val="FFFFFF"/>
-                  </a:solidFill>
-                  <a:prstDash val="solid"/>
-                </a:ln>
-                <a:solidFill>
-                  <a:srgbClr val="00B0F0"/>
-                </a:solidFill>
-                <a:effectLst>
-                  <a:outerShdw blurRad="63500" dir="3600000" algn="tl" rotWithShape="0">
-                    <a:srgbClr val="000000">
-                      <a:alpha val="70000"/>
-                    </a:srgbClr>
-                  </a:outerShdw>
-                </a:effectLst>
-                <a:latin typeface="Gill Sans MT Condensed" pitchFamily="34" charset="0"/>
-              </a:rPr>
-              <a:t>Hash</a:t>
+              <a:t> Hash</a:t>
             </a:r>
             <a:endParaRPr lang="zh-CN" altLang="en-US" sz="4800" dirty="0">
-              <a:ln w="18415" cmpd="sng">
-                <a:solidFill>
-                  <a:srgbClr val="FFFFFF"/>
-                </a:solidFill>
-                <a:prstDash val="solid"/>
-              </a:ln>
               <a:solidFill>
-                <a:srgbClr val="00B0F0"/>
+                <a:srgbClr val="FFC000"/>
               </a:solidFill>
-              <a:effectLst>
-                <a:outerShdw blurRad="63500" dir="3600000" algn="tl" rotWithShape="0">
-                  <a:srgbClr val="000000">
-                    <a:alpha val="70000"/>
-                  </a:srgbClr>
-                </a:outerShdw>
-              </a:effectLst>
               <a:latin typeface="Gill Sans MT Condensed" pitchFamily="34" charset="0"/>
             </a:endParaRPr>
           </a:p>
@@ -7404,65 +6840,17 @@
             </a:pPr>
             <a:r>
               <a:rPr lang="en-US" altLang="zh-CN" sz="4800" dirty="0" smtClean="0">
-                <a:ln w="18415" cmpd="sng">
-                  <a:solidFill>
-                    <a:srgbClr val="FFFFFF"/>
-                  </a:solidFill>
-                  <a:prstDash val="solid"/>
-                </a:ln>
                 <a:solidFill>
-                  <a:srgbClr val="00B0F0"/>
+                  <a:srgbClr val="FFC000"/>
                 </a:solidFill>
-                <a:effectLst>
-                  <a:outerShdw blurRad="63500" dir="3600000" algn="tl" rotWithShape="0">
-                    <a:srgbClr val="000000">
-                      <a:alpha val="70000"/>
-                    </a:srgbClr>
-                  </a:outerShdw>
-                </a:effectLst>
                 <a:latin typeface="Gill Sans MT Condensed" pitchFamily="34" charset="0"/>
               </a:rPr>
-              <a:t> </a:t>
-            </a:r>
-            <a:r>
-              <a:rPr lang="en-US" altLang="zh-CN" sz="4800" dirty="0" smtClean="0">
-                <a:ln w="18415" cmpd="sng">
-                  <a:solidFill>
-                    <a:srgbClr val="FFFFFF"/>
-                  </a:solidFill>
-                  <a:prstDash val="solid"/>
-                </a:ln>
-                <a:solidFill>
-                  <a:srgbClr val="00B0F0"/>
-                </a:solidFill>
-                <a:effectLst>
-                  <a:outerShdw blurRad="63500" dir="3600000" algn="tl" rotWithShape="0">
-                    <a:srgbClr val="000000">
-                      <a:alpha val="70000"/>
-                    </a:srgbClr>
-                  </a:outerShdw>
-                </a:effectLst>
-                <a:latin typeface="Gill Sans MT Condensed" pitchFamily="34" charset="0"/>
-              </a:rPr>
-              <a:t>Type Glob</a:t>
+              <a:t> Type Glob</a:t>
             </a:r>
             <a:endParaRPr lang="zh-CN" altLang="en-US" sz="4800" dirty="0">
-              <a:ln w="18415" cmpd="sng">
-                <a:solidFill>
-                  <a:srgbClr val="FFFFFF"/>
-                </a:solidFill>
-                <a:prstDash val="solid"/>
-              </a:ln>
               <a:solidFill>
-                <a:srgbClr val="00B0F0"/>
+                <a:srgbClr val="FFC000"/>
               </a:solidFill>
-              <a:effectLst>
-                <a:outerShdw blurRad="63500" dir="3600000" algn="tl" rotWithShape="0">
-                  <a:srgbClr val="000000">
-                    <a:alpha val="70000"/>
-                  </a:srgbClr>
-                </a:outerShdw>
-              </a:effectLst>
               <a:latin typeface="Gill Sans MT Condensed" pitchFamily="34" charset="0"/>
             </a:endParaRPr>
           </a:p>
@@ -16231,68 +15619,14 @@
               <a:buChar char="-"/>
             </a:pPr>
             <a:r>
-              <a:rPr lang="en-US" altLang="zh-CN" sz="4800" b="1" dirty="0" smtClean="0">
-                <a:ln w="31550" cmpd="sng">
-                  <a:solidFill>
-                    <a:srgbClr val="00B0F0"/>
-                  </a:solidFill>
-                  <a:prstDash val="solid"/>
-                </a:ln>
-                <a:noFill/>
-                <a:effectLst>
-                  <a:outerShdw blurRad="50800" dist="40000" dir="5400000" algn="tl" rotWithShape="0">
-                    <a:srgbClr val="000000">
-                      <a:shade val="5000"/>
-                      <a:satMod val="120000"/>
-                      <a:alpha val="33000"/>
-                    </a:srgbClr>
-                  </a:outerShdw>
-                </a:effectLst>
+              <a:rPr lang="en-US" altLang="zh-CN" sz="4800" dirty="0" smtClean="0">
+                <a:solidFill>
+                  <a:srgbClr val="FFC000"/>
+                </a:solidFill>
                 <a:latin typeface="Gill Sans MT Condensed" pitchFamily="34" charset="0"/>
               </a:rPr>
-              <a:t> Symbol Table </a:t>
+              <a:t> Symbol Table (%main:: | %::)</a:t>
             </a:r>
-            <a:r>
-              <a:rPr lang="en-US" altLang="zh-CN" sz="4800" b="1" dirty="0" smtClean="0">
-                <a:ln w="31550" cmpd="sng">
-                  <a:solidFill>
-                    <a:srgbClr val="00B0F0"/>
-                  </a:solidFill>
-                  <a:prstDash val="solid"/>
-                </a:ln>
-                <a:noFill/>
-                <a:effectLst>
-                  <a:outerShdw blurRad="50800" dist="40000" dir="5400000" algn="tl" rotWithShape="0">
-                    <a:srgbClr val="000000">
-                      <a:shade val="5000"/>
-                      <a:satMod val="120000"/>
-                      <a:alpha val="33000"/>
-                    </a:srgbClr>
-                  </a:outerShdw>
-                </a:effectLst>
-                <a:latin typeface="Gill Sans MT Condensed" pitchFamily="34" charset="0"/>
-              </a:rPr>
-              <a:t>(%main:: | %::)</a:t>
-            </a:r>
-            <a:endParaRPr lang="en-US" altLang="zh-CN" sz="4800" b="1" dirty="0" smtClean="0">
-              <a:ln w="31550" cmpd="sng">
-                <a:solidFill>
-                  <a:srgbClr val="00B0F0"/>
-                </a:solidFill>
-                <a:prstDash val="solid"/>
-              </a:ln>
-              <a:noFill/>
-              <a:effectLst>
-                <a:outerShdw blurRad="50800" dist="40000" dir="5400000" algn="tl" rotWithShape="0">
-                  <a:srgbClr val="000000">
-                    <a:shade val="5000"/>
-                    <a:satMod val="120000"/>
-                    <a:alpha val="33000"/>
-                  </a:srgbClr>
-                </a:outerShdw>
-              </a:effectLst>
-              <a:latin typeface="Gill Sans MT Condensed" pitchFamily="34" charset="0"/>
-            </a:endParaRPr>
           </a:p>
           <a:p>
             <a:pPr>
@@ -16300,23 +15634,10 @@
               <a:buChar char="-"/>
             </a:pPr>
             <a:r>
-              <a:rPr lang="en-US" altLang="zh-CN" sz="4800" b="1" dirty="0" smtClean="0">
-                <a:ln w="31550" cmpd="sng">
-                  <a:solidFill>
-                    <a:srgbClr val="00B0F0"/>
-                  </a:solidFill>
-                  <a:prstDash val="solid"/>
-                </a:ln>
-                <a:noFill/>
-                <a:effectLst>
-                  <a:outerShdw blurRad="50800" dist="40000" dir="5400000" algn="tl" rotWithShape="0">
-                    <a:srgbClr val="000000">
-                      <a:shade val="5000"/>
-                      <a:satMod val="120000"/>
-                      <a:alpha val="33000"/>
-                    </a:srgbClr>
-                  </a:outerShdw>
-                </a:effectLst>
+              <a:rPr lang="en-US" altLang="zh-CN" sz="4800" dirty="0" smtClean="0">
+                <a:solidFill>
+                  <a:srgbClr val="FFC000"/>
+                </a:solidFill>
                 <a:latin typeface="Gill Sans MT Condensed" pitchFamily="34" charset="0"/>
               </a:rPr>
               <a:t> Lexical Scoping (my)</a:t>
@@ -16328,46 +15649,14 @@
               <a:buChar char="-"/>
             </a:pPr>
             <a:r>
-              <a:rPr lang="en-US" altLang="zh-CN" sz="4800" b="1" dirty="0" smtClean="0">
-                <a:ln w="31550" cmpd="sng">
-                  <a:solidFill>
-                    <a:srgbClr val="00B0F0"/>
-                  </a:solidFill>
-                  <a:prstDash val="solid"/>
-                </a:ln>
-                <a:noFill/>
-                <a:effectLst>
-                  <a:outerShdw blurRad="50800" dist="40000" dir="5400000" algn="tl" rotWithShape="0">
-                    <a:srgbClr val="000000">
-                      <a:shade val="5000"/>
-                      <a:satMod val="120000"/>
-                      <a:alpha val="33000"/>
-                    </a:srgbClr>
-                  </a:outerShdw>
-                </a:effectLst>
+              <a:rPr lang="en-US" altLang="zh-CN" sz="4800" dirty="0" smtClean="0">
+                <a:solidFill>
+                  <a:srgbClr val="FFC000"/>
+                </a:solidFill>
                 <a:latin typeface="Gill Sans MT Condensed" pitchFamily="34" charset="0"/>
               </a:rPr>
               <a:t> Dynamic Scoping (local)</a:t>
             </a:r>
-            <a:endParaRPr lang="en-US" altLang="zh-CN" sz="4800" b="1" dirty="0" smtClean="0">
-              <a:ln w="31550" cmpd="sng">
-                <a:solidFill>
-                  <a:srgbClr val="00B0F0"/>
-                </a:solidFill>
-                <a:prstDash val="solid"/>
-              </a:ln>
-              <a:noFill/>
-              <a:effectLst>
-                <a:outerShdw blurRad="50800" dist="40000" dir="5400000" algn="tl" rotWithShape="0">
-                  <a:srgbClr val="000000">
-                    <a:shade val="5000"/>
-                    <a:satMod val="120000"/>
-                    <a:alpha val="33000"/>
-                  </a:srgbClr>
-                </a:outerShdw>
-              </a:effectLst>
-              <a:latin typeface="Gill Sans MT Condensed" pitchFamily="34" charset="0"/>
-            </a:endParaRPr>
           </a:p>
           <a:p>
             <a:pPr>
@@ -16375,23 +15664,10 @@
               <a:buChar char="-"/>
             </a:pPr>
             <a:r>
-              <a:rPr lang="en-US" altLang="zh-CN" sz="4800" b="1" dirty="0" smtClean="0">
-                <a:ln w="31550" cmpd="sng">
-                  <a:solidFill>
-                    <a:srgbClr val="00B0F0"/>
-                  </a:solidFill>
-                  <a:prstDash val="solid"/>
-                </a:ln>
-                <a:noFill/>
-                <a:effectLst>
-                  <a:outerShdw blurRad="50800" dist="40000" dir="5400000" algn="tl" rotWithShape="0">
-                    <a:srgbClr val="000000">
-                      <a:shade val="5000"/>
-                      <a:satMod val="120000"/>
-                      <a:alpha val="33000"/>
-                    </a:srgbClr>
-                  </a:outerShdw>
-                </a:effectLst>
+              <a:rPr lang="en-US" altLang="zh-CN" sz="4800" dirty="0" smtClean="0">
+                <a:solidFill>
+                  <a:srgbClr val="FFC000"/>
+                </a:solidFill>
                 <a:latin typeface="Gill Sans MT Condensed" pitchFamily="34" charset="0"/>
               </a:rPr>
               <a:t> Package Scoping (our)</a:t>
@@ -26058,7 +25334,7 @@
         <p:spPr>
           <a:xfrm>
             <a:off x="144418" y="1804966"/>
-            <a:ext cx="11787270" cy="6001643"/>
+            <a:ext cx="11787270" cy="6740307"/>
           </a:xfrm>
           <a:prstGeom prst="rect">
             <a:avLst/>
@@ -26076,23 +25352,10 @@
               <a:buChar char="-"/>
             </a:pPr>
             <a:r>
-              <a:rPr lang="en-US" altLang="zh-CN" sz="4800" b="1" dirty="0" smtClean="0">
-                <a:ln w="31550" cmpd="sng">
-                  <a:solidFill>
-                    <a:srgbClr val="00B0F0"/>
-                  </a:solidFill>
-                  <a:prstDash val="solid"/>
-                </a:ln>
-                <a:noFill/>
-                <a:effectLst>
-                  <a:outerShdw blurRad="50800" dist="40000" dir="5400000" algn="tl" rotWithShape="0">
-                    <a:srgbClr val="000000">
-                      <a:shade val="5000"/>
-                      <a:satMod val="120000"/>
-                      <a:alpha val="33000"/>
-                    </a:srgbClr>
-                  </a:outerShdw>
-                </a:effectLst>
+              <a:rPr lang="en-US" altLang="zh-CN" sz="4800" dirty="0" smtClean="0">
+                <a:solidFill>
+                  <a:srgbClr val="FFC000"/>
+                </a:solidFill>
                 <a:latin typeface="Gill Sans MT Condensed" pitchFamily="34" charset="0"/>
               </a:rPr>
               <a:t> Module (.pm)</a:t>
@@ -26104,161 +25367,10 @@
               <a:buChar char="-"/>
             </a:pPr>
             <a:r>
-              <a:rPr lang="en-US" altLang="zh-CN" sz="4800" b="1" dirty="0" smtClean="0">
-                <a:ln w="31550" cmpd="sng">
-                  <a:solidFill>
-                    <a:srgbClr val="00B0F0"/>
-                  </a:solidFill>
-                  <a:prstDash val="solid"/>
-                </a:ln>
-                <a:noFill/>
-                <a:effectLst>
-                  <a:outerShdw blurRad="50800" dist="40000" dir="5400000" algn="tl" rotWithShape="0">
-                    <a:srgbClr val="000000">
-                      <a:shade val="5000"/>
-                      <a:satMod val="120000"/>
-                      <a:alpha val="33000"/>
-                    </a:srgbClr>
-                  </a:outerShdw>
-                </a:effectLst>
-                <a:latin typeface="Gill Sans MT Condensed" pitchFamily="34" charset="0"/>
-              </a:rPr>
-              <a:t> </a:t>
-            </a:r>
-            <a:r>
-              <a:rPr lang="en-US" altLang="zh-CN" sz="4800" b="1" dirty="0" smtClean="0">
-                <a:ln w="31550" cmpd="sng">
-                  <a:solidFill>
-                    <a:srgbClr val="00B0F0"/>
-                  </a:solidFill>
-                  <a:prstDash val="solid"/>
-                </a:ln>
-                <a:noFill/>
-                <a:effectLst>
-                  <a:outerShdw blurRad="50800" dist="40000" dir="5400000" algn="tl" rotWithShape="0">
-                    <a:srgbClr val="000000">
-                      <a:shade val="5000"/>
-                      <a:satMod val="120000"/>
-                      <a:alpha val="33000"/>
-                    </a:srgbClr>
-                  </a:outerShdw>
-                </a:effectLst>
-                <a:latin typeface="Gill Sans MT Condensed" pitchFamily="34" charset="0"/>
-              </a:rPr>
-              <a:t>Regular Expression</a:t>
-            </a:r>
-            <a:endParaRPr lang="en-US" altLang="zh-CN" sz="4800" b="1" dirty="0" smtClean="0">
-              <a:ln w="31550" cmpd="sng">
+              <a:rPr lang="en-US" altLang="zh-CN" sz="4800" dirty="0" smtClean="0">
                 <a:solidFill>
-                  <a:srgbClr val="00B0F0"/>
+                  <a:srgbClr val="FFC000"/>
                 </a:solidFill>
-                <a:prstDash val="solid"/>
-              </a:ln>
-              <a:noFill/>
-              <a:effectLst>
-                <a:outerShdw blurRad="50800" dist="40000" dir="5400000" algn="tl" rotWithShape="0">
-                  <a:srgbClr val="000000">
-                    <a:shade val="5000"/>
-                    <a:satMod val="120000"/>
-                    <a:alpha val="33000"/>
-                  </a:srgbClr>
-                </a:outerShdw>
-              </a:effectLst>
-              <a:latin typeface="Gill Sans MT Condensed" pitchFamily="34" charset="0"/>
-            </a:endParaRPr>
-          </a:p>
-          <a:p>
-            <a:pPr>
-              <a:buFontTx/>
-              <a:buChar char="-"/>
-            </a:pPr>
-            <a:r>
-              <a:rPr lang="en-US" altLang="zh-CN" sz="4800" b="1" dirty="0" smtClean="0">
-                <a:ln w="31550" cmpd="sng">
-                  <a:solidFill>
-                    <a:srgbClr val="00B0F0"/>
-                  </a:solidFill>
-                  <a:prstDash val="solid"/>
-                </a:ln>
-                <a:noFill/>
-                <a:effectLst>
-                  <a:outerShdw blurRad="50800" dist="40000" dir="5400000" algn="tl" rotWithShape="0">
-                    <a:srgbClr val="000000">
-                      <a:shade val="5000"/>
-                      <a:satMod val="120000"/>
-                      <a:alpha val="33000"/>
-                    </a:srgbClr>
-                  </a:outerShdw>
-                </a:effectLst>
-                <a:latin typeface="Gill Sans MT Condensed" pitchFamily="34" charset="0"/>
-              </a:rPr>
-              <a:t> </a:t>
-            </a:r>
-            <a:r>
-              <a:rPr lang="en-US" altLang="zh-CN" sz="4800" b="1" dirty="0" smtClean="0">
-                <a:ln w="31550" cmpd="sng">
-                  <a:solidFill>
-                    <a:srgbClr val="00B0F0"/>
-                  </a:solidFill>
-                  <a:prstDash val="solid"/>
-                </a:ln>
-                <a:noFill/>
-                <a:effectLst>
-                  <a:outerShdw blurRad="50800" dist="40000" dir="5400000" algn="tl" rotWithShape="0">
-                    <a:srgbClr val="000000">
-                      <a:shade val="5000"/>
-                      <a:satMod val="120000"/>
-                      <a:alpha val="33000"/>
-                    </a:srgbClr>
-                  </a:outerShdw>
-                </a:effectLst>
-                <a:latin typeface="Gill Sans MT Condensed" pitchFamily="34" charset="0"/>
-              </a:rPr>
-              <a:t>More Lib (CPAN)</a:t>
-            </a:r>
-            <a:endParaRPr lang="en-US" altLang="zh-CN" sz="4800" b="1" dirty="0" smtClean="0">
-              <a:ln w="31550" cmpd="sng">
-                <a:solidFill>
-                  <a:srgbClr val="00B0F0"/>
-                </a:solidFill>
-                <a:prstDash val="solid"/>
-              </a:ln>
-              <a:noFill/>
-              <a:effectLst>
-                <a:outerShdw blurRad="50800" dist="40000" dir="5400000" algn="tl" rotWithShape="0">
-                  <a:srgbClr val="000000">
-                    <a:shade val="5000"/>
-                    <a:satMod val="120000"/>
-                    <a:alpha val="33000"/>
-                  </a:srgbClr>
-                </a:outerShdw>
-              </a:effectLst>
-              <a:latin typeface="Gill Sans MT Condensed" pitchFamily="34" charset="0"/>
-            </a:endParaRPr>
-          </a:p>
-          <a:p>
-            <a:pPr>
-              <a:buFontTx/>
-              <a:buChar char="-"/>
-            </a:pPr>
-            <a:r>
-              <a:rPr lang="en-US" altLang="zh-CN" sz="4800" b="1" dirty="0" smtClean="0">
-                <a:ln w="31550" cmpd="sng">
-                  <a:solidFill>
-                    <a:srgbClr val="00B0F0"/>
-                  </a:solidFill>
-                  <a:prstDash val="solid"/>
-                </a:ln>
-                <a:noFill/>
-                <a:effectLst>
-                  <a:outerShdw blurRad="50800" dist="40000" dir="5400000" algn="tl" rotWithShape="0">
-                    <a:srgbClr val="000000">
-                      <a:shade val="5000"/>
-                      <a:satMod val="120000"/>
-                      <a:alpha val="33000"/>
-                    </a:srgbClr>
-                  </a:outerShdw>
-                </a:effectLst>
                 <a:latin typeface="Gill Sans MT Condensed" pitchFamily="34" charset="0"/>
               </a:rPr>
               <a:t> OOP</a:t>
@@ -26270,46 +25382,14 @@
               <a:buChar char="-"/>
             </a:pPr>
             <a:r>
-              <a:rPr lang="en-US" altLang="zh-CN" sz="4800" b="1" dirty="0" smtClean="0">
-                <a:ln w="31550" cmpd="sng">
-                  <a:solidFill>
-                    <a:srgbClr val="00B0F0"/>
-                  </a:solidFill>
-                  <a:prstDash val="solid"/>
-                </a:ln>
-                <a:noFill/>
-                <a:effectLst>
-                  <a:outerShdw blurRad="50800" dist="40000" dir="5400000" algn="tl" rotWithShape="0">
-                    <a:srgbClr val="000000">
-                      <a:shade val="5000"/>
-                      <a:satMod val="120000"/>
-                      <a:alpha val="33000"/>
-                    </a:srgbClr>
-                  </a:outerShdw>
-                </a:effectLst>
+              <a:rPr lang="en-US" altLang="zh-CN" sz="4800" dirty="0" smtClean="0">
+                <a:solidFill>
+                  <a:srgbClr val="FFC000"/>
+                </a:solidFill>
                 <a:latin typeface="Gill Sans MT Condensed" pitchFamily="34" charset="0"/>
               </a:rPr>
-              <a:t> Moose</a:t>
+              <a:t> Regular Expression</a:t>
             </a:r>
-            <a:endParaRPr lang="en-US" altLang="zh-CN" sz="4800" b="1" dirty="0" smtClean="0">
-              <a:ln w="31550" cmpd="sng">
-                <a:solidFill>
-                  <a:srgbClr val="00B0F0"/>
-                </a:solidFill>
-                <a:prstDash val="solid"/>
-              </a:ln>
-              <a:noFill/>
-              <a:effectLst>
-                <a:outerShdw blurRad="50800" dist="40000" dir="5400000" algn="tl" rotWithShape="0">
-                  <a:srgbClr val="000000">
-                    <a:shade val="5000"/>
-                    <a:satMod val="120000"/>
-                    <a:alpha val="33000"/>
-                  </a:srgbClr>
-                </a:outerShdw>
-              </a:effectLst>
-              <a:latin typeface="Gill Sans MT Condensed" pitchFamily="34" charset="0"/>
-            </a:endParaRPr>
           </a:p>
           <a:p>
             <a:pPr>
@@ -26317,46 +25397,14 @@
               <a:buChar char="-"/>
             </a:pPr>
             <a:r>
-              <a:rPr lang="en-US" altLang="zh-CN" sz="4800" b="1" dirty="0" smtClean="0">
-                <a:ln w="31550" cmpd="sng">
-                  <a:solidFill>
-                    <a:srgbClr val="00B0F0"/>
-                  </a:solidFill>
-                  <a:prstDash val="solid"/>
-                </a:ln>
-                <a:noFill/>
-                <a:effectLst>
-                  <a:outerShdw blurRad="50800" dist="40000" dir="5400000" algn="tl" rotWithShape="0">
-                    <a:srgbClr val="000000">
-                      <a:shade val="5000"/>
-                      <a:satMod val="120000"/>
-                      <a:alpha val="33000"/>
-                    </a:srgbClr>
-                  </a:outerShdw>
-                </a:effectLst>
+              <a:rPr lang="en-US" altLang="zh-CN" sz="4800" dirty="0" smtClean="0">
+                <a:solidFill>
+                  <a:srgbClr val="FFC000"/>
+                </a:solidFill>
                 <a:latin typeface="Gill Sans MT Condensed" pitchFamily="34" charset="0"/>
               </a:rPr>
-              <a:t> Design Patterns</a:t>
+              <a:t> More Lib (CPAN)</a:t>
             </a:r>
-            <a:endParaRPr lang="en-US" altLang="zh-CN" sz="4800" b="1" dirty="0" smtClean="0">
-              <a:ln w="31550" cmpd="sng">
-                <a:solidFill>
-                  <a:srgbClr val="00B0F0"/>
-                </a:solidFill>
-                <a:prstDash val="solid"/>
-              </a:ln>
-              <a:noFill/>
-              <a:effectLst>
-                <a:outerShdw blurRad="50800" dist="40000" dir="5400000" algn="tl" rotWithShape="0">
-                  <a:srgbClr val="000000">
-                    <a:shade val="5000"/>
-                    <a:satMod val="120000"/>
-                    <a:alpha val="33000"/>
-                  </a:srgbClr>
-                </a:outerShdw>
-              </a:effectLst>
-              <a:latin typeface="Gill Sans MT Condensed" pitchFamily="34" charset="0"/>
-            </a:endParaRPr>
           </a:p>
           <a:p>
             <a:pPr>
@@ -26364,67 +25412,109 @@
               <a:buChar char="-"/>
             </a:pPr>
             <a:r>
-              <a:rPr lang="en-US" altLang="zh-CN" sz="4800" b="1" dirty="0" smtClean="0">
-                <a:ln w="31550" cmpd="sng">
-                  <a:solidFill>
-                    <a:srgbClr val="00B0F0"/>
-                  </a:solidFill>
-                  <a:prstDash val="solid"/>
-                </a:ln>
-                <a:noFill/>
-                <a:effectLst>
-                  <a:outerShdw blurRad="50800" dist="40000" dir="5400000" algn="tl" rotWithShape="0">
-                    <a:srgbClr val="000000">
-                      <a:shade val="5000"/>
-                      <a:satMod val="120000"/>
-                      <a:alpha val="33000"/>
-                    </a:srgbClr>
-                  </a:outerShdw>
-                </a:effectLst>
+              <a:rPr lang="en-US" altLang="zh-CN" sz="4800" dirty="0" smtClean="0">
+                <a:solidFill>
+                  <a:srgbClr val="FFC000"/>
+                </a:solidFill>
+                <a:latin typeface="Gill Sans MT Condensed" pitchFamily="34" charset="0"/>
+              </a:rPr>
+              <a:t> Tools (</a:t>
+            </a:r>
+            <a:r>
+              <a:rPr lang="en-US" altLang="zh-CN" sz="4800" dirty="0" err="1" smtClean="0">
+                <a:solidFill>
+                  <a:srgbClr val="FFC000"/>
+                </a:solidFill>
+                <a:latin typeface="Gill Sans MT Condensed" pitchFamily="34" charset="0"/>
+              </a:rPr>
+              <a:t>perltidy</a:t>
+            </a:r>
+            <a:r>
+              <a:rPr lang="en-US" altLang="zh-CN" sz="4800" dirty="0" smtClean="0">
+                <a:solidFill>
+                  <a:srgbClr val="FFC000"/>
+                </a:solidFill>
+                <a:latin typeface="Gill Sans MT Condensed" pitchFamily="34" charset="0"/>
+              </a:rPr>
+              <a:t> log4perl </a:t>
+            </a:r>
+            <a:r>
+              <a:rPr lang="en-US" altLang="zh-CN" sz="4800" dirty="0" err="1" smtClean="0">
+                <a:solidFill>
+                  <a:srgbClr val="FFC000"/>
+                </a:solidFill>
+                <a:latin typeface="Gill Sans MT Condensed" pitchFamily="34" charset="0"/>
+              </a:rPr>
+              <a:t>perlbrew</a:t>
+            </a:r>
+            <a:r>
+              <a:rPr lang="en-US" altLang="zh-CN" sz="4800" dirty="0" smtClean="0">
+                <a:solidFill>
+                  <a:srgbClr val="FFC000"/>
+                </a:solidFill>
+                <a:latin typeface="Gill Sans MT Condensed" pitchFamily="34" charset="0"/>
+              </a:rPr>
+              <a:t> a2p/s2p find2perl, etc)</a:t>
+            </a:r>
+          </a:p>
+          <a:p>
+            <a:pPr>
+              <a:buFontTx/>
+              <a:buChar char="-"/>
+            </a:pPr>
+            <a:r>
+              <a:rPr lang="en-US" altLang="zh-CN" sz="4800" dirty="0" smtClean="0">
+                <a:solidFill>
+                  <a:srgbClr val="FFC000"/>
+                </a:solidFill>
+                <a:latin typeface="Gill Sans MT Condensed" pitchFamily="34" charset="0"/>
+              </a:rPr>
+              <a:t> Moose</a:t>
+            </a:r>
+          </a:p>
+          <a:p>
+            <a:pPr>
+              <a:buFontTx/>
+              <a:buChar char="-"/>
+            </a:pPr>
+            <a:r>
+              <a:rPr lang="en-US" altLang="zh-CN" sz="4800" dirty="0" smtClean="0">
+                <a:solidFill>
+                  <a:srgbClr val="FFC000"/>
+                </a:solidFill>
+                <a:latin typeface="Gill Sans MT Condensed" pitchFamily="34" charset="0"/>
+              </a:rPr>
+              <a:t> Design Patterns</a:t>
+            </a:r>
+          </a:p>
+          <a:p>
+            <a:pPr>
+              <a:buFontTx/>
+              <a:buChar char="-"/>
+            </a:pPr>
+            <a:r>
+              <a:rPr lang="en-US" altLang="zh-CN" sz="4800" dirty="0" smtClean="0">
+                <a:solidFill>
+                  <a:srgbClr val="FFC000"/>
+                </a:solidFill>
                 <a:latin typeface="Gill Sans MT Condensed" pitchFamily="34" charset="0"/>
               </a:rPr>
               <a:t> Web Framework (</a:t>
             </a:r>
             <a:r>
-              <a:rPr lang="en-US" altLang="zh-CN" sz="4800" b="1" dirty="0" err="1" smtClean="0">
-                <a:ln w="31550" cmpd="sng">
-                  <a:solidFill>
-                    <a:srgbClr val="00B0F0"/>
-                  </a:solidFill>
-                  <a:prstDash val="solid"/>
-                </a:ln>
-                <a:noFill/>
-                <a:effectLst>
-                  <a:outerShdw blurRad="50800" dist="40000" dir="5400000" algn="tl" rotWithShape="0">
-                    <a:srgbClr val="000000">
-                      <a:shade val="5000"/>
-                      <a:satMod val="120000"/>
-                      <a:alpha val="33000"/>
-                    </a:srgbClr>
-                  </a:outerShdw>
-                </a:effectLst>
+              <a:rPr lang="en-US" altLang="zh-CN" sz="4800" dirty="0" err="1" smtClean="0">
+                <a:solidFill>
+                  <a:srgbClr val="FFC000"/>
+                </a:solidFill>
                 <a:latin typeface="Gill Sans MT Condensed" pitchFamily="34" charset="0"/>
               </a:rPr>
               <a:t>mojo</a:t>
             </a:r>
             <a:r>
-              <a:rPr lang="en-US" altLang="zh-CN" sz="4800" b="1" dirty="0" smtClean="0">
-                <a:ln w="31550" cmpd="sng">
-                  <a:solidFill>
-                    <a:srgbClr val="00B0F0"/>
-                  </a:solidFill>
-                  <a:prstDash val="solid"/>
-                </a:ln>
-                <a:noFill/>
-                <a:effectLst>
-                  <a:outerShdw blurRad="50800" dist="40000" dir="5400000" algn="tl" rotWithShape="0">
-                    <a:srgbClr val="000000">
-                      <a:shade val="5000"/>
-                      <a:satMod val="120000"/>
-                      <a:alpha val="33000"/>
-                    </a:srgbClr>
-                  </a:outerShdw>
-                </a:effectLst>
+              <a:rPr lang="en-US" altLang="zh-CN" sz="4800" dirty="0" smtClean="0">
+                <a:solidFill>
+                  <a:srgbClr val="FFC000"/>
+                </a:solidFill>
                 <a:latin typeface="Gill Sans MT Condensed" pitchFamily="34" charset="0"/>
               </a:rPr>
               <a:t> catalyst dancer, etc)</a:t>
@@ -27044,7 +26134,7 @@
         <p:spPr>
           <a:xfrm>
             <a:off x="144418" y="3590916"/>
-            <a:ext cx="11787270" cy="2308324"/>
+            <a:ext cx="11787270" cy="3046988"/>
           </a:xfrm>
           <a:prstGeom prst="rect">
             <a:avLst/>
@@ -27058,245 +26148,115 @@
           <a:lstStyle/>
           <a:p>
             <a:r>
-              <a:rPr lang="en-US" altLang="zh-CN" sz="4800" b="1" dirty="0" smtClean="0">
-                <a:ln w="31550" cmpd="sng">
-                  <a:solidFill>
-                    <a:srgbClr val="00B0F0"/>
-                  </a:solidFill>
-                  <a:prstDash val="solid"/>
-                </a:ln>
-                <a:noFill/>
-                <a:effectLst>
-                  <a:outerShdw blurRad="50800" dist="40000" dir="5400000" algn="tl" rotWithShape="0">
-                    <a:srgbClr val="000000">
-                      <a:shade val="5000"/>
-                      <a:satMod val="120000"/>
-                      <a:alpha val="33000"/>
-                    </a:srgbClr>
-                  </a:outerShdw>
-                </a:effectLst>
+              <a:rPr lang="en-US" altLang="zh-CN" sz="4800" dirty="0" smtClean="0">
+                <a:solidFill>
+                  <a:srgbClr val="FFC000"/>
+                </a:solidFill>
                 <a:latin typeface="Gill Sans MT Condensed" pitchFamily="34" charset="0"/>
               </a:rPr>
               <a:t>- Learning Perl in 6</a:t>
             </a:r>
             <a:r>
-              <a:rPr lang="en-US" altLang="zh-CN" sz="4800" b="1" baseline="30000" dirty="0" smtClean="0">
-                <a:ln w="31550" cmpd="sng">
-                  <a:solidFill>
-                    <a:srgbClr val="00B0F0"/>
-                  </a:solidFill>
-                  <a:prstDash val="solid"/>
-                </a:ln>
-                <a:noFill/>
-                <a:effectLst>
-                  <a:outerShdw blurRad="50800" dist="40000" dir="5400000" algn="tl" rotWithShape="0">
-                    <a:srgbClr val="000000">
-                      <a:shade val="5000"/>
-                      <a:satMod val="120000"/>
-                      <a:alpha val="33000"/>
-                    </a:srgbClr>
-                  </a:outerShdw>
-                </a:effectLst>
+              <a:rPr lang="en-US" altLang="zh-CN" sz="4800" baseline="30000" dirty="0" smtClean="0">
+                <a:solidFill>
+                  <a:srgbClr val="FFC000"/>
+                </a:solidFill>
                 <a:latin typeface="Gill Sans MT Condensed" pitchFamily="34" charset="0"/>
               </a:rPr>
               <a:t>th</a:t>
             </a:r>
             <a:r>
-              <a:rPr lang="en-US" altLang="zh-CN" sz="4800" b="1" dirty="0" smtClean="0">
-                <a:ln w="31550" cmpd="sng">
-                  <a:solidFill>
-                    <a:srgbClr val="00B0F0"/>
-                  </a:solidFill>
-                  <a:prstDash val="solid"/>
-                </a:ln>
-                <a:noFill/>
-                <a:effectLst>
-                  <a:outerShdw blurRad="50800" dist="40000" dir="5400000" algn="tl" rotWithShape="0">
-                    <a:srgbClr val="000000">
-                      <a:shade val="5000"/>
-                      <a:satMod val="120000"/>
-                      <a:alpha val="33000"/>
-                    </a:srgbClr>
-                  </a:outerShdw>
-                </a:effectLst>
+              <a:rPr lang="en-US" altLang="zh-CN" sz="4800" dirty="0" smtClean="0">
+                <a:solidFill>
+                  <a:srgbClr val="FFC000"/>
+                </a:solidFill>
                 <a:latin typeface="Gill Sans MT Condensed" pitchFamily="34" charset="0"/>
               </a:rPr>
               <a:t> Edition by Randal L. Schwartz</a:t>
             </a:r>
-            <a:endParaRPr lang="en-US" altLang="zh-CN" sz="4800" b="1" dirty="0" smtClean="0">
-              <a:ln w="31550" cmpd="sng">
-                <a:solidFill>
-                  <a:srgbClr val="00B0F0"/>
-                </a:solidFill>
-                <a:prstDash val="solid"/>
-              </a:ln>
-              <a:noFill/>
-              <a:effectLst>
-                <a:outerShdw blurRad="50800" dist="40000" dir="5400000" algn="tl" rotWithShape="0">
-                  <a:srgbClr val="000000">
-                    <a:shade val="5000"/>
-                    <a:satMod val="120000"/>
-                    <a:alpha val="33000"/>
-                  </a:srgbClr>
-                </a:outerShdw>
-              </a:effectLst>
-              <a:latin typeface="Gill Sans MT Condensed" pitchFamily="34" charset="0"/>
-            </a:endParaRPr>
           </a:p>
           <a:p>
+            <a:pPr>
+              <a:buFontTx/>
+              <a:buChar char="-"/>
+            </a:pPr>
             <a:r>
-              <a:rPr lang="en-US" altLang="zh-CN" sz="4800" b="1" dirty="0" smtClean="0">
-                <a:ln w="31550" cmpd="sng">
-                  <a:solidFill>
-                    <a:srgbClr val="00B0F0"/>
-                  </a:solidFill>
-                  <a:prstDash val="solid"/>
-                </a:ln>
-                <a:noFill/>
-                <a:effectLst>
-                  <a:outerShdw blurRad="50800" dist="40000" dir="5400000" algn="tl" rotWithShape="0">
-                    <a:srgbClr val="000000">
-                      <a:shade val="5000"/>
-                      <a:satMod val="120000"/>
-                      <a:alpha val="33000"/>
-                    </a:srgbClr>
-                  </a:outerShdw>
-                </a:effectLst>
+              <a:rPr lang="en-US" altLang="zh-CN" sz="4800" dirty="0" smtClean="0">
+                <a:solidFill>
+                  <a:srgbClr val="FFC000"/>
+                </a:solidFill>
                 <a:latin typeface="Gill Sans MT Condensed" pitchFamily="34" charset="0"/>
               </a:rPr>
-              <a:t>- Developing Web Applications with Perl, </a:t>
+              <a:t> Developing Web Applications with Perl, </a:t>
             </a:r>
             <a:r>
-              <a:rPr lang="en-US" altLang="zh-CN" sz="4800" b="1" dirty="0" err="1" smtClean="0">
-                <a:ln w="31550" cmpd="sng">
-                  <a:solidFill>
-                    <a:srgbClr val="00B0F0"/>
-                  </a:solidFill>
-                  <a:prstDash val="solid"/>
-                </a:ln>
-                <a:noFill/>
-                <a:effectLst>
-                  <a:outerShdw blurRad="50800" dist="40000" dir="5400000" algn="tl" rotWithShape="0">
-                    <a:srgbClr val="000000">
-                      <a:shade val="5000"/>
-                      <a:satMod val="120000"/>
-                      <a:alpha val="33000"/>
-                    </a:srgbClr>
-                  </a:outerShdw>
-                </a:effectLst>
+              <a:rPr lang="en-US" altLang="zh-CN" sz="4800" dirty="0" err="1" smtClean="0">
+                <a:solidFill>
+                  <a:srgbClr val="FFC000"/>
+                </a:solidFill>
                 <a:latin typeface="Gill Sans MT Condensed" pitchFamily="34" charset="0"/>
               </a:rPr>
               <a:t>memcached</a:t>
             </a:r>
             <a:r>
-              <a:rPr lang="en-US" altLang="zh-CN" sz="4800" b="1" dirty="0" smtClean="0">
-                <a:ln w="31550" cmpd="sng">
-                  <a:solidFill>
-                    <a:srgbClr val="00B0F0"/>
-                  </a:solidFill>
-                  <a:prstDash val="solid"/>
-                </a:ln>
-                <a:noFill/>
-                <a:effectLst>
-                  <a:outerShdw blurRad="50800" dist="40000" dir="5400000" algn="tl" rotWithShape="0">
-                    <a:srgbClr val="000000">
-                      <a:shade val="5000"/>
-                      <a:satMod val="120000"/>
-                      <a:alpha val="33000"/>
-                    </a:srgbClr>
-                  </a:outerShdw>
-                </a:effectLst>
+              <a:rPr lang="en-US" altLang="zh-CN" sz="4800" dirty="0" smtClean="0">
+                <a:solidFill>
+                  <a:srgbClr val="FFC000"/>
+                </a:solidFill>
                 <a:latin typeface="Gill Sans MT Condensed" pitchFamily="34" charset="0"/>
               </a:rPr>
               <a:t>, </a:t>
             </a:r>
             <a:r>
-              <a:rPr lang="en-US" altLang="zh-CN" sz="4800" b="1" dirty="0" err="1" smtClean="0">
-                <a:ln w="31550" cmpd="sng">
-                  <a:solidFill>
-                    <a:srgbClr val="00B0F0"/>
-                  </a:solidFill>
-                  <a:prstDash val="solid"/>
-                </a:ln>
-                <a:noFill/>
-                <a:effectLst>
-                  <a:outerShdw blurRad="50800" dist="40000" dir="5400000" algn="tl" rotWithShape="0">
-                    <a:srgbClr val="000000">
-                      <a:shade val="5000"/>
-                      <a:satMod val="120000"/>
-                      <a:alpha val="33000"/>
-                    </a:srgbClr>
-                  </a:outerShdw>
-                </a:effectLst>
+              <a:rPr lang="en-US" altLang="zh-CN" sz="4800" dirty="0" err="1" smtClean="0">
+                <a:solidFill>
+                  <a:srgbClr val="FFC000"/>
+                </a:solidFill>
                 <a:latin typeface="Gill Sans MT Condensed" pitchFamily="34" charset="0"/>
               </a:rPr>
               <a:t>MySQL</a:t>
             </a:r>
             <a:r>
-              <a:rPr lang="en-US" altLang="zh-CN" sz="4800" b="1" dirty="0" smtClean="0">
-                <a:ln w="31550" cmpd="sng">
-                  <a:solidFill>
-                    <a:srgbClr val="00B0F0"/>
-                  </a:solidFill>
-                  <a:prstDash val="solid"/>
-                </a:ln>
-                <a:noFill/>
-                <a:effectLst>
-                  <a:outerShdw blurRad="50800" dist="40000" dir="5400000" algn="tl" rotWithShape="0">
-                    <a:srgbClr val="000000">
-                      <a:shade val="5000"/>
-                      <a:satMod val="120000"/>
-                      <a:alpha val="33000"/>
-                    </a:srgbClr>
-                  </a:outerShdw>
-                </a:effectLst>
+              <a:rPr lang="en-US" altLang="zh-CN" sz="4800" dirty="0" smtClean="0">
+                <a:solidFill>
+                  <a:srgbClr val="FFC000"/>
+                </a:solidFill>
                 <a:latin typeface="Gill Sans MT Condensed" pitchFamily="34" charset="0"/>
               </a:rPr>
               <a:t> and Apache by </a:t>
             </a:r>
             <a:r>
-              <a:rPr lang="en-US" altLang="zh-CN" sz="4800" b="1" dirty="0" err="1" smtClean="0">
-                <a:ln w="31550" cmpd="sng">
-                  <a:solidFill>
-                    <a:srgbClr val="00B0F0"/>
-                  </a:solidFill>
-                  <a:prstDash val="solid"/>
-                </a:ln>
-                <a:noFill/>
-                <a:effectLst>
-                  <a:outerShdw blurRad="50800" dist="40000" dir="5400000" algn="tl" rotWithShape="0">
-                    <a:srgbClr val="000000">
-                      <a:shade val="5000"/>
-                      <a:satMod val="120000"/>
-                      <a:alpha val="33000"/>
-                    </a:srgbClr>
-                  </a:outerShdw>
-                </a:effectLst>
+              <a:rPr lang="en-US" altLang="zh-CN" sz="4800" dirty="0" err="1" smtClean="0">
+                <a:solidFill>
+                  <a:srgbClr val="FFC000"/>
+                </a:solidFill>
                 <a:latin typeface="Gill Sans MT Condensed" pitchFamily="34" charset="0"/>
               </a:rPr>
               <a:t>Patrict</a:t>
             </a:r>
             <a:r>
-              <a:rPr lang="en-US" altLang="zh-CN" sz="4800" b="1" dirty="0" smtClean="0">
-                <a:ln w="31550" cmpd="sng">
-                  <a:solidFill>
-                    <a:srgbClr val="00B0F0"/>
-                  </a:solidFill>
-                  <a:prstDash val="solid"/>
-                </a:ln>
-                <a:noFill/>
-                <a:effectLst>
-                  <a:outerShdw blurRad="50800" dist="40000" dir="5400000" algn="tl" rotWithShape="0">
-                    <a:srgbClr val="000000">
-                      <a:shade val="5000"/>
-                      <a:satMod val="120000"/>
-                      <a:alpha val="33000"/>
-                    </a:srgbClr>
-                  </a:outerShdw>
-                </a:effectLst>
+              <a:rPr lang="en-US" altLang="zh-CN" sz="4800" dirty="0" smtClean="0">
+                <a:solidFill>
+                  <a:srgbClr val="FFC000"/>
+                </a:solidFill>
                 <a:latin typeface="Gill Sans MT Condensed" pitchFamily="34" charset="0"/>
               </a:rPr>
               <a:t> Galbraith</a:t>
+            </a:r>
+          </a:p>
+          <a:p>
+            <a:pPr>
+              <a:buFontTx/>
+              <a:buChar char="-"/>
+            </a:pPr>
+            <a:r>
+              <a:rPr lang="en-US" altLang="zh-CN" sz="4800" dirty="0" smtClean="0">
+                <a:solidFill>
+                  <a:srgbClr val="FFC000"/>
+                </a:solidFill>
+                <a:latin typeface="Gill Sans MT Condensed" pitchFamily="34" charset="0"/>
+              </a:rPr>
+              <a:t> http://perlhacks.com/about/</a:t>
             </a:r>
           </a:p>
         </p:txBody>
@@ -28832,46 +27792,14 @@
               </a:rPr>
               <a:t>:</a:t>
             </a:r>
-            <a:endParaRPr lang="en-US" altLang="zh-CN" sz="6600" dirty="0" smtClean="0">
-              <a:ln w="18415" cmpd="sng">
-                <a:solidFill>
-                  <a:srgbClr val="FFFFFF"/>
-                </a:solidFill>
-                <a:prstDash val="solid"/>
-              </a:ln>
-              <a:solidFill>
-                <a:srgbClr val="FFFFFF"/>
-              </a:solidFill>
-              <a:effectLst>
-                <a:outerShdw blurRad="63500" dir="3600000" algn="tl" rotWithShape="0">
-                  <a:srgbClr val="000000">
-                    <a:alpha val="70000"/>
-                  </a:srgbClr>
-                </a:outerShdw>
-              </a:effectLst>
-              <a:latin typeface="Gill Sans MT Condensed" pitchFamily="34" charset="0"/>
-            </a:endParaRPr>
           </a:p>
           <a:p>
             <a:pPr algn="r"/>
             <a:r>
-              <a:rPr lang="en-US" altLang="zh-CN" sz="4800" b="1" dirty="0" smtClean="0">
-                <a:ln w="31550" cmpd="sng">
-                  <a:solidFill>
-                    <a:srgbClr val="00B0F0"/>
-                  </a:solidFill>
-                  <a:prstDash val="solid"/>
-                </a:ln>
-                <a:noFill/>
-                <a:effectLst>
-                  <a:outerShdw blurRad="50800" dist="40000" dir="5400000" algn="tl" rotWithShape="0">
-                    <a:srgbClr val="000000">
-                      <a:shade val="5000"/>
-                      <a:satMod val="120000"/>
-                      <a:alpha val="33000"/>
-                    </a:srgbClr>
-                  </a:outerShdw>
-                </a:effectLst>
+              <a:rPr lang="en-US" altLang="zh-CN" sz="4800" dirty="0" smtClean="0">
+                <a:solidFill>
+                  <a:srgbClr val="FFC000"/>
+                </a:solidFill>
                 <a:latin typeface="Gill Sans MT Condensed" pitchFamily="34" charset="0"/>
               </a:rPr>
               <a:t>bigdatapi@qq.com</a:t>
@@ -28880,46 +27808,14 @@
           <a:p>
             <a:pPr algn="r"/>
             <a:r>
-              <a:rPr lang="en-US" altLang="zh-CN" sz="4800" b="1" dirty="0" smtClean="0">
-                <a:ln w="31550" cmpd="sng">
-                  <a:solidFill>
-                    <a:srgbClr val="00B0F0"/>
-                  </a:solidFill>
-                  <a:prstDash val="solid"/>
-                </a:ln>
-                <a:noFill/>
-                <a:effectLst>
-                  <a:outerShdw blurRad="50800" dist="40000" dir="5400000" algn="tl" rotWithShape="0">
-                    <a:srgbClr val="000000">
-                      <a:shade val="5000"/>
-                      <a:satMod val="120000"/>
-                      <a:alpha val="33000"/>
-                    </a:srgbClr>
-                  </a:outerShdw>
-                </a:effectLst>
+              <a:rPr lang="en-US" altLang="zh-CN" sz="4800" dirty="0" smtClean="0">
+                <a:solidFill>
+                  <a:srgbClr val="FFC000"/>
+                </a:solidFill>
                 <a:latin typeface="Gill Sans MT Condensed" pitchFamily="34" charset="0"/>
               </a:rPr>
               <a:t>bigdatapi.com</a:t>
             </a:r>
-            <a:endParaRPr lang="en-US" altLang="zh-CN" sz="4800" b="1" dirty="0" smtClean="0">
-              <a:ln w="31550" cmpd="sng">
-                <a:solidFill>
-                  <a:srgbClr val="00B0F0"/>
-                </a:solidFill>
-                <a:prstDash val="solid"/>
-              </a:ln>
-              <a:noFill/>
-              <a:effectLst>
-                <a:outerShdw blurRad="50800" dist="40000" dir="5400000" algn="tl" rotWithShape="0">
-                  <a:srgbClr val="000000">
-                    <a:shade val="5000"/>
-                    <a:satMod val="120000"/>
-                    <a:alpha val="33000"/>
-                  </a:srgbClr>
-                </a:outerShdw>
-              </a:effectLst>
-              <a:latin typeface="Gill Sans MT Condensed" pitchFamily="34" charset="0"/>
-            </a:endParaRPr>
           </a:p>
         </p:txBody>
       </p:sp>
@@ -29005,81 +27901,19 @@
                 </a:solidFill>
                 <a:latin typeface="Gill Sans MT Condensed" pitchFamily="34" charset="0"/>
               </a:rPr>
-              <a:t>Sources Download Here</a:t>
+              <a:t>Sources Download Here:</a:t>
             </a:r>
-            <a:r>
-              <a:rPr lang="en-US" altLang="zh-CN" sz="6600" dirty="0" smtClean="0">
-                <a:ln w="18415" cmpd="sng">
-                  <a:solidFill>
-                    <a:srgbClr val="FFFFFF"/>
-                  </a:solidFill>
-                  <a:prstDash val="solid"/>
-                </a:ln>
-                <a:solidFill>
-                  <a:schemeClr val="bg1"/>
-                </a:solidFill>
-                <a:latin typeface="Gill Sans MT Condensed" pitchFamily="34" charset="0"/>
-              </a:rPr>
-              <a:t>:</a:t>
-            </a:r>
-            <a:endParaRPr lang="en-US" altLang="zh-CN" sz="6600" dirty="0" smtClean="0">
-              <a:ln w="18415" cmpd="sng">
-                <a:solidFill>
-                  <a:srgbClr val="FFFFFF"/>
-                </a:solidFill>
-                <a:prstDash val="solid"/>
-              </a:ln>
-              <a:solidFill>
-                <a:schemeClr val="bg1"/>
-              </a:solidFill>
-              <a:latin typeface="Gill Sans MT Condensed" pitchFamily="34" charset="0"/>
-            </a:endParaRPr>
           </a:p>
           <a:p>
             <a:pPr algn="r"/>
             <a:r>
-              <a:rPr lang="en-US" altLang="zh-CN" sz="4800" b="1" dirty="0" smtClean="0">
-                <a:ln w="31550" cmpd="sng">
-                  <a:solidFill>
-                    <a:srgbClr val="00B0F0"/>
-                  </a:solidFill>
-                  <a:prstDash val="solid"/>
-                </a:ln>
-                <a:noFill/>
-                <a:effectLst>
-                  <a:outerShdw blurRad="50800" dist="40000" dir="5400000" algn="tl" rotWithShape="0">
-                    <a:srgbClr val="000000">
-                      <a:shade val="5000"/>
-                      <a:satMod val="120000"/>
-                      <a:alpha val="33000"/>
-                    </a:srgbClr>
-                  </a:outerShdw>
-                </a:effectLst>
+              <a:rPr lang="en-US" altLang="zh-CN" sz="4800" dirty="0" smtClean="0">
+                <a:solidFill>
+                  <a:srgbClr val="FFC000"/>
+                </a:solidFill>
                 <a:latin typeface="Gill Sans MT Condensed" pitchFamily="34" charset="0"/>
               </a:rPr>
-              <a:t>https</a:t>
-            </a:r>
-            <a:r>
-              <a:rPr lang="en-US" altLang="zh-CN" sz="4800" b="1" dirty="0" smtClean="0">
-                <a:ln w="31550" cmpd="sng">
-                  <a:solidFill>
-                    <a:srgbClr val="00B0F0"/>
-                  </a:solidFill>
-                  <a:prstDash val="solid"/>
-                </a:ln>
-                <a:noFill/>
-                <a:effectLst>
-                  <a:outerShdw blurRad="50800" dist="40000" dir="5400000" algn="tl" rotWithShape="0">
-                    <a:srgbClr val="000000">
-                      <a:shade val="5000"/>
-                      <a:satMod val="120000"/>
-                      <a:alpha val="33000"/>
-                    </a:srgbClr>
-                  </a:outerShdw>
-                </a:effectLst>
-                <a:latin typeface="Gill Sans MT Condensed" pitchFamily="34" charset="0"/>
-              </a:rPr>
-              <a:t>://github.com/bigdatapi/learn_perl_in_2hours</a:t>
+              <a:t>https://github.com/bigdatapi/learn_perl_in_2hours</a:t>
             </a:r>
           </a:p>
         </p:txBody>
@@ -30118,43 +28952,17 @@
             </a:pPr>
             <a:r>
               <a:rPr lang="en-US" altLang="zh-CN" sz="4800" dirty="0" smtClean="0">
-                <a:ln w="18415" cmpd="sng">
-                  <a:solidFill>
-                    <a:srgbClr val="FFFFFF"/>
-                  </a:solidFill>
-                  <a:prstDash val="solid"/>
-                </a:ln>
                 <a:solidFill>
-                  <a:srgbClr val="00B0F0"/>
+                  <a:srgbClr val="FFC000"/>
                 </a:solidFill>
-                <a:effectLst>
-                  <a:outerShdw blurRad="63500" dir="3600000" algn="tl" rotWithShape="0">
-                    <a:srgbClr val="000000">
-                      <a:alpha val="70000"/>
-                    </a:srgbClr>
-                  </a:outerShdw>
-                </a:effectLst>
                 <a:latin typeface="Gill Sans MT Condensed" pitchFamily="34" charset="0"/>
               </a:rPr>
               <a:t> Fibonacci sequence [1, 1, 2, 3, 5, 8...]</a:t>
             </a:r>
             <a:endParaRPr lang="zh-CN" altLang="en-US" sz="4800" dirty="0">
-              <a:ln w="18415" cmpd="sng">
-                <a:solidFill>
-                  <a:srgbClr val="FFFFFF"/>
-                </a:solidFill>
-                <a:prstDash val="solid"/>
-              </a:ln>
               <a:solidFill>
-                <a:srgbClr val="00B0F0"/>
+                <a:srgbClr val="FFC000"/>
               </a:solidFill>
-              <a:effectLst>
-                <a:outerShdw blurRad="63500" dir="3600000" algn="tl" rotWithShape="0">
-                  <a:srgbClr val="000000">
-                    <a:alpha val="70000"/>
-                  </a:srgbClr>
-                </a:outerShdw>
-              </a:effectLst>
               <a:latin typeface="Gill Sans MT Condensed" pitchFamily="34" charset="0"/>
             </a:endParaRPr>
           </a:p>
@@ -30191,43 +28999,17 @@
             </a:pPr>
             <a:r>
               <a:rPr lang="en-US" altLang="zh-CN" sz="4800" dirty="0" smtClean="0">
-                <a:ln w="18415" cmpd="sng">
-                  <a:solidFill>
-                    <a:srgbClr val="FFFFFF"/>
-                  </a:solidFill>
-                  <a:prstDash val="solid"/>
-                </a:ln>
                 <a:solidFill>
-                  <a:srgbClr val="00B0F0"/>
+                  <a:srgbClr val="FFC000"/>
                 </a:solidFill>
-                <a:effectLst>
-                  <a:outerShdw blurRad="63500" dir="3600000" algn="tl" rotWithShape="0">
-                    <a:srgbClr val="000000">
-                      <a:alpha val="70000"/>
-                    </a:srgbClr>
-                  </a:outerShdw>
-                </a:effectLst>
                 <a:latin typeface="Gill Sans MT Condensed" pitchFamily="34" charset="0"/>
               </a:rPr>
               <a:t> Read input from user, loop until EOF</a:t>
             </a:r>
             <a:endParaRPr lang="zh-CN" altLang="en-US" sz="4800" dirty="0">
-              <a:ln w="18415" cmpd="sng">
-                <a:solidFill>
-                  <a:srgbClr val="FFFFFF"/>
-                </a:solidFill>
-                <a:prstDash val="solid"/>
-              </a:ln>
               <a:solidFill>
-                <a:srgbClr val="00B0F0"/>
+                <a:srgbClr val="FFC000"/>
               </a:solidFill>
-              <a:effectLst>
-                <a:outerShdw blurRad="63500" dir="3600000" algn="tl" rotWithShape="0">
-                  <a:srgbClr val="000000">
-                    <a:alpha val="70000"/>
-                  </a:srgbClr>
-                </a:outerShdw>
-              </a:effectLst>
               <a:latin typeface="Gill Sans MT Condensed" pitchFamily="34" charset="0"/>
             </a:endParaRPr>
           </a:p>
@@ -30264,43 +29046,17 @@
             </a:pPr>
             <a:r>
               <a:rPr lang="en-US" altLang="zh-CN" sz="4800" dirty="0" smtClean="0">
-                <a:ln w="18415" cmpd="sng">
-                  <a:solidFill>
-                    <a:srgbClr val="FFFFFF"/>
-                  </a:solidFill>
-                  <a:prstDash val="solid"/>
-                </a:ln>
                 <a:solidFill>
-                  <a:srgbClr val="00B0F0"/>
+                  <a:srgbClr val="FFC000"/>
                 </a:solidFill>
-                <a:effectLst>
-                  <a:outerShdw blurRad="63500" dir="3600000" algn="tl" rotWithShape="0">
-                    <a:srgbClr val="000000">
-                      <a:alpha val="70000"/>
-                    </a:srgbClr>
-                  </a:outerShdw>
-                </a:effectLst>
                 <a:latin typeface="Gill Sans MT Condensed" pitchFamily="34" charset="0"/>
               </a:rPr>
               <a:t> Do valid check for user input</a:t>
             </a:r>
             <a:endParaRPr lang="zh-CN" altLang="en-US" sz="4800" dirty="0">
-              <a:ln w="18415" cmpd="sng">
-                <a:solidFill>
-                  <a:srgbClr val="FFFFFF"/>
-                </a:solidFill>
-                <a:prstDash val="solid"/>
-              </a:ln>
               <a:solidFill>
-                <a:srgbClr val="00B0F0"/>
+                <a:srgbClr val="FFC000"/>
               </a:solidFill>
-              <a:effectLst>
-                <a:outerShdw blurRad="63500" dir="3600000" algn="tl" rotWithShape="0">
-                  <a:srgbClr val="000000">
-                    <a:alpha val="70000"/>
-                  </a:srgbClr>
-                </a:outerShdw>
-              </a:effectLst>
               <a:latin typeface="Gill Sans MT Condensed" pitchFamily="34" charset="0"/>
             </a:endParaRPr>
           </a:p>
@@ -30337,65 +29093,26 @@
             </a:pPr>
             <a:r>
               <a:rPr lang="en-US" altLang="zh-CN" sz="4800" dirty="0" smtClean="0">
-                <a:ln w="18415" cmpd="sng">
-                  <a:solidFill>
-                    <a:srgbClr val="FFFFFF"/>
-                  </a:solidFill>
-                  <a:prstDash val="solid"/>
-                </a:ln>
                 <a:solidFill>
-                  <a:srgbClr val="00B0F0"/>
+                  <a:srgbClr val="FFC000"/>
                 </a:solidFill>
-                <a:effectLst>
-                  <a:outerShdw blurRad="63500" dir="3600000" algn="tl" rotWithShape="0">
-                    <a:srgbClr val="000000">
-                      <a:alpha val="70000"/>
-                    </a:srgbClr>
-                  </a:outerShdw>
-                </a:effectLst>
                 <a:latin typeface="Gill Sans MT Condensed" pitchFamily="34" charset="0"/>
               </a:rPr>
               <a:t> Print welcome info, as well as fib </a:t>
             </a:r>
             <a:r>
               <a:rPr lang="en-US" altLang="zh-CN" sz="4800" dirty="0" err="1" smtClean="0">
-                <a:ln w="18415" cmpd="sng">
-                  <a:solidFill>
-                    <a:srgbClr val="FFFFFF"/>
-                  </a:solidFill>
-                  <a:prstDash val="solid"/>
-                </a:ln>
                 <a:solidFill>
-                  <a:srgbClr val="00B0F0"/>
+                  <a:srgbClr val="FFC000"/>
                 </a:solidFill>
-                <a:effectLst>
-                  <a:outerShdw blurRad="63500" dir="3600000" algn="tl" rotWithShape="0">
-                    <a:srgbClr val="000000">
-                      <a:alpha val="70000"/>
-                    </a:srgbClr>
-                  </a:outerShdw>
-                </a:effectLst>
                 <a:latin typeface="Gill Sans MT Condensed" pitchFamily="34" charset="0"/>
               </a:rPr>
               <a:t>nums</a:t>
             </a:r>
             <a:endParaRPr lang="zh-CN" altLang="en-US" sz="4800" dirty="0">
-              <a:ln w="18415" cmpd="sng">
-                <a:solidFill>
-                  <a:srgbClr val="FFFFFF"/>
-                </a:solidFill>
-                <a:prstDash val="solid"/>
-              </a:ln>
               <a:solidFill>
-                <a:srgbClr val="00B0F0"/>
+                <a:srgbClr val="FFC000"/>
               </a:solidFill>
-              <a:effectLst>
-                <a:outerShdw blurRad="63500" dir="3600000" algn="tl" rotWithShape="0">
-                  <a:srgbClr val="000000">
-                    <a:alpha val="70000"/>
-                  </a:srgbClr>
-                </a:outerShdw>
-              </a:effectLst>
               <a:latin typeface="Gill Sans MT Condensed" pitchFamily="34" charset="0"/>
             </a:endParaRPr>
           </a:p>
@@ -30432,43 +29149,17 @@
             </a:pPr>
             <a:r>
               <a:rPr lang="en-US" altLang="zh-CN" sz="4800" dirty="0" smtClean="0">
-                <a:ln w="18415" cmpd="sng">
-                  <a:solidFill>
-                    <a:srgbClr val="FFFFFF"/>
-                  </a:solidFill>
-                  <a:prstDash val="solid"/>
-                </a:ln>
                 <a:solidFill>
-                  <a:srgbClr val="00B0F0"/>
+                  <a:srgbClr val="FFC000"/>
                 </a:solidFill>
-                <a:effectLst>
-                  <a:outerShdw blurRad="63500" dir="3600000" algn="tl" rotWithShape="0">
-                    <a:srgbClr val="000000">
-                      <a:alpha val="70000"/>
-                    </a:srgbClr>
-                  </a:outerShdw>
-                </a:effectLst>
                 <a:latin typeface="Gill Sans MT Condensed" pitchFamily="34" charset="0"/>
               </a:rPr>
               <a:t> Encapsulate to functions for re-usage</a:t>
             </a:r>
             <a:endParaRPr lang="zh-CN" altLang="en-US" sz="4800" dirty="0">
-              <a:ln w="18415" cmpd="sng">
-                <a:solidFill>
-                  <a:srgbClr val="FFFFFF"/>
-                </a:solidFill>
-                <a:prstDash val="solid"/>
-              </a:ln>
               <a:solidFill>
-                <a:srgbClr val="00B0F0"/>
+                <a:srgbClr val="FFC000"/>
               </a:solidFill>
-              <a:effectLst>
-                <a:outerShdw blurRad="63500" dir="3600000" algn="tl" rotWithShape="0">
-                  <a:srgbClr val="000000">
-                    <a:alpha val="70000"/>
-                  </a:srgbClr>
-                </a:outerShdw>
-              </a:effectLst>
               <a:latin typeface="Gill Sans MT Condensed" pitchFamily="34" charset="0"/>
             </a:endParaRPr>
           </a:p>
@@ -30505,43 +29196,17 @@
             </a:pPr>
             <a:r>
               <a:rPr lang="en-US" altLang="zh-CN" sz="4800" dirty="0" smtClean="0">
-                <a:ln w="18415" cmpd="sng">
-                  <a:solidFill>
-                    <a:srgbClr val="FFFFFF"/>
-                  </a:solidFill>
-                  <a:prstDash val="solid"/>
-                </a:ln>
                 <a:solidFill>
-                  <a:srgbClr val="00B0F0"/>
+                  <a:srgbClr val="FFC000"/>
                 </a:solidFill>
-                <a:effectLst>
-                  <a:outerShdw blurRad="63500" dir="3600000" algn="tl" rotWithShape="0">
-                    <a:srgbClr val="000000">
-                      <a:alpha val="70000"/>
-                    </a:srgbClr>
-                  </a:outerShdw>
-                </a:effectLst>
                 <a:latin typeface="Gill Sans MT Condensed" pitchFamily="34" charset="0"/>
               </a:rPr>
               <a:t> Analyze complexity and make it visible</a:t>
             </a:r>
             <a:endParaRPr lang="zh-CN" altLang="en-US" sz="4800" dirty="0">
-              <a:ln w="18415" cmpd="sng">
-                <a:solidFill>
-                  <a:srgbClr val="FFFFFF"/>
-                </a:solidFill>
-                <a:prstDash val="solid"/>
-              </a:ln>
               <a:solidFill>
-                <a:srgbClr val="00B0F0"/>
+                <a:srgbClr val="FFC000"/>
               </a:solidFill>
-              <a:effectLst>
-                <a:outerShdw blurRad="63500" dir="3600000" algn="tl" rotWithShape="0">
-                  <a:srgbClr val="000000">
-                    <a:alpha val="70000"/>
-                  </a:srgbClr>
-                </a:outerShdw>
-              </a:effectLst>
               <a:latin typeface="Gill Sans MT Condensed" pitchFamily="34" charset="0"/>
             </a:endParaRPr>
           </a:p>
@@ -30578,43 +29243,17 @@
             </a:pPr>
             <a:r>
               <a:rPr lang="en-US" altLang="zh-CN" sz="4800" dirty="0" smtClean="0">
-                <a:ln w="18415" cmpd="sng">
-                  <a:solidFill>
-                    <a:srgbClr val="FFFFFF"/>
-                  </a:solidFill>
-                  <a:prstDash val="solid"/>
-                </a:ln>
                 <a:solidFill>
-                  <a:srgbClr val="00B0F0"/>
+                  <a:srgbClr val="FFC000"/>
                 </a:solidFill>
-                <a:effectLst>
-                  <a:outerShdw blurRad="63500" dir="3600000" algn="tl" rotWithShape="0">
-                    <a:srgbClr val="000000">
-                      <a:alpha val="70000"/>
-                    </a:srgbClr>
-                  </a:outerShdw>
-                </a:effectLst>
                 <a:latin typeface="Gill Sans MT Condensed" pitchFamily="34" charset="0"/>
               </a:rPr>
               <a:t> Optimize it</a:t>
             </a:r>
             <a:endParaRPr lang="zh-CN" altLang="en-US" sz="4800" dirty="0">
-              <a:ln w="18415" cmpd="sng">
-                <a:solidFill>
-                  <a:srgbClr val="FFFFFF"/>
-                </a:solidFill>
-                <a:prstDash val="solid"/>
-              </a:ln>
               <a:solidFill>
-                <a:srgbClr val="00B0F0"/>
+                <a:srgbClr val="FFC000"/>
               </a:solidFill>
-              <a:effectLst>
-                <a:outerShdw blurRad="63500" dir="3600000" algn="tl" rotWithShape="0">
-                  <a:srgbClr val="000000">
-                    <a:alpha val="70000"/>
-                  </a:srgbClr>
-                </a:outerShdw>
-              </a:effectLst>
               <a:latin typeface="Gill Sans MT Condensed" pitchFamily="34" charset="0"/>
             </a:endParaRPr>
           </a:p>

</xml_diff>